<commit_message>
Modificando el archivo ave en la Rama1
</commit_message>
<xml_diff>
--- a/TAREA_GRUPO5/ave.pptx
+++ b/TAREA_GRUPO5/ave.pptx
@@ -6,6 +6,7 @@
   </p:sldMasterIdLst>
   <p:sldIdLst>
     <p:sldId id="274" r:id="rId2"/>
+    <p:sldId id="277" r:id="rId3"/>
   </p:sldIdLst>
   <p:sldSz cx="12192000" cy="6858000"/>
   <p:notesSz cx="6858000" cy="9144000"/>
@@ -104,6 +105,11 @@
       </a:defRPr>
     </a:lvl9pPr>
   </p:defaultTextStyle>
+  <p:extLst>
+    <p:ext uri="{EFAFB233-063F-42B5-8137-9DF3F51BA10A}">
+      <p15:sldGuideLst xmlns:p15="http://schemas.microsoft.com/office/powerpoint/2012/main"/>
+    </p:ext>
+  </p:extLst>
 </p:presentation>
 </file>
 
@@ -608,13 +614,1049 @@
 </c:chartSpace>
 </file>
 
+<file path=ppt/charts/chart2.xml><?xml version="1.0" encoding="utf-8"?>
+<c:chartSpace xmlns:c="http://schemas.openxmlformats.org/drawingml/2006/chart" xmlns:a="http://schemas.openxmlformats.org/drawingml/2006/main" xmlns:r="http://schemas.openxmlformats.org/officeDocument/2006/relationships" xmlns:c16r2="http://schemas.microsoft.com/office/drawing/2015/06/chart">
+  <c:date1904 val="0"/>
+  <c:lang val="es-ES"/>
+  <c:roundedCorners val="0"/>
+  <mc:AlternateContent xmlns:mc="http://schemas.openxmlformats.org/markup-compatibility/2006">
+    <mc:Choice xmlns:c14="http://schemas.microsoft.com/office/drawing/2007/8/2/chart" Requires="c14">
+      <c14:style val="102"/>
+    </mc:Choice>
+    <mc:Fallback>
+      <c:style val="2"/>
+    </mc:Fallback>
+  </mc:AlternateContent>
+  <c:chart>
+    <c:title>
+      <c:tx>
+        <c:rich>
+          <a:bodyPr rot="0" spcFirstLastPara="1" vertOverflow="ellipsis" vert="horz" wrap="square" anchor="ctr" anchorCtr="1"/>
+          <a:lstStyle/>
+          <a:p>
+            <a:pPr>
+              <a:defRPr sz="1200" b="1" i="0" u="none" strike="noStrike" kern="1200" baseline="0">
+                <a:solidFill>
+                  <a:schemeClr val="tx1">
+                    <a:lumMod val="65000"/>
+                    <a:lumOff val="35000"/>
+                  </a:schemeClr>
+                </a:solidFill>
+                <a:effectLst>
+                  <a:outerShdw blurRad="38100" dist="38100" dir="2700000" algn="tl">
+                    <a:srgbClr val="000000">
+                      <a:alpha val="43137"/>
+                    </a:srgbClr>
+                  </a:outerShdw>
+                </a:effectLst>
+                <a:latin typeface="+mn-lt"/>
+                <a:ea typeface="+mn-ea"/>
+                <a:cs typeface="+mn-cs"/>
+              </a:defRPr>
+            </a:pPr>
+            <a:r>
+              <a:rPr lang="es-ES">
+                <a:effectLst>
+                  <a:outerShdw blurRad="38100" dist="38100" dir="2700000" algn="tl">
+                    <a:srgbClr val="000000">
+                      <a:alpha val="43137"/>
+                    </a:srgbClr>
+                  </a:outerShdw>
+                </a:effectLst>
+              </a:rPr>
+              <a:t>Amplitud de nicho de </a:t>
+            </a:r>
+            <a:r>
+              <a:rPr lang="en-US">
+                <a:effectLst>
+                  <a:outerShdw blurRad="38100" dist="38100" dir="2700000" algn="tl">
+                    <a:srgbClr val="000000">
+                      <a:alpha val="43137"/>
+                    </a:srgbClr>
+                  </a:outerShdw>
+                </a:effectLst>
+              </a:rPr>
+              <a:t>Anas bahamensis</a:t>
+            </a:r>
+          </a:p>
+        </c:rich>
+      </c:tx>
+      <c:layout>
+        <c:manualLayout>
+          <c:xMode val="edge"/>
+          <c:yMode val="edge"/>
+          <c:x val="0.25841666666666668"/>
+          <c:y val="3.0467639715767235E-2"/>
+        </c:manualLayout>
+      </c:layout>
+      <c:overlay val="0"/>
+      <c:spPr>
+        <a:noFill/>
+        <a:ln>
+          <a:noFill/>
+        </a:ln>
+        <a:effectLst/>
+      </c:spPr>
+      <c:txPr>
+        <a:bodyPr rot="0" spcFirstLastPara="1" vertOverflow="ellipsis" vert="horz" wrap="square" anchor="ctr" anchorCtr="1"/>
+        <a:lstStyle/>
+        <a:p>
+          <a:pPr>
+            <a:defRPr sz="1200" b="1" i="0" u="none" strike="noStrike" kern="1200" baseline="0">
+              <a:solidFill>
+                <a:schemeClr val="tx1">
+                  <a:lumMod val="65000"/>
+                  <a:lumOff val="35000"/>
+                </a:schemeClr>
+              </a:solidFill>
+              <a:effectLst>
+                <a:outerShdw blurRad="38100" dist="38100" dir="2700000" algn="tl">
+                  <a:srgbClr val="000000">
+                    <a:alpha val="43137"/>
+                  </a:srgbClr>
+                </a:outerShdw>
+              </a:effectLst>
+              <a:latin typeface="+mn-lt"/>
+              <a:ea typeface="+mn-ea"/>
+              <a:cs typeface="+mn-cs"/>
+            </a:defRPr>
+          </a:pPr>
+          <a:endParaRPr lang="es-ES"/>
+        </a:p>
+      </c:txPr>
+    </c:title>
+    <c:autoTitleDeleted val="0"/>
+    <c:plotArea>
+      <c:layout/>
+      <c:lineChart>
+        <c:grouping val="standard"/>
+        <c:varyColors val="0"/>
+        <c:ser>
+          <c:idx val="0"/>
+          <c:order val="0"/>
+          <c:tx>
+            <c:strRef>
+              <c:f>Hoja1!$B$84</c:f>
+              <c:strCache>
+                <c:ptCount val="1"/>
+                <c:pt idx="0">
+                  <c:v>Anas bahamensis</c:v>
+                </c:pt>
+              </c:strCache>
+            </c:strRef>
+          </c:tx>
+          <c:spPr>
+            <a:ln w="34925" cap="rnd">
+              <a:solidFill>
+                <a:schemeClr val="accent2"/>
+              </a:solidFill>
+              <a:round/>
+            </a:ln>
+            <a:effectLst>
+              <a:outerShdw blurRad="40000" dist="23000" dir="5400000" rotWithShape="0">
+                <a:srgbClr val="000000">
+                  <a:alpha val="35000"/>
+                </a:srgbClr>
+              </a:outerShdw>
+            </a:effectLst>
+          </c:spPr>
+          <c:marker>
+            <c:symbol val="none"/>
+          </c:marker>
+          <c:cat>
+            <c:strRef>
+              <c:f>Hoja1!$A$85:$A$89</c:f>
+              <c:strCache>
+                <c:ptCount val="5"/>
+                <c:pt idx="0">
+                  <c:v>Laguna Mayor</c:v>
+                </c:pt>
+                <c:pt idx="1">
+                  <c:v>Laguna Marvilla</c:v>
+                </c:pt>
+                <c:pt idx="2">
+                  <c:v>JuncaI</c:v>
+                </c:pt>
+                <c:pt idx="3">
+                  <c:v>Gramadal y ArenaI</c:v>
+                </c:pt>
+                <c:pt idx="4">
+                  <c:v>Arbustal</c:v>
+                </c:pt>
+              </c:strCache>
+            </c:strRef>
+          </c:cat>
+          <c:val>
+            <c:numRef>
+              <c:f>Hoja1!$B$85:$B$89</c:f>
+              <c:numCache>
+                <c:formatCode>General</c:formatCode>
+                <c:ptCount val="5"/>
+                <c:pt idx="0">
+                  <c:v>10</c:v>
+                </c:pt>
+                <c:pt idx="1">
+                  <c:v>4</c:v>
+                </c:pt>
+                <c:pt idx="2">
+                  <c:v>0</c:v>
+                </c:pt>
+                <c:pt idx="3">
+                  <c:v>0</c:v>
+                </c:pt>
+                <c:pt idx="4">
+                  <c:v>0</c:v>
+                </c:pt>
+              </c:numCache>
+            </c:numRef>
+          </c:val>
+          <c:smooth val="0"/>
+          <c:extLst>
+            <c:ext xmlns:c16="http://schemas.microsoft.com/office/drawing/2014/chart" uri="{C3380CC4-5D6E-409C-BE32-E72D297353CC}">
+              <c16:uniqueId val="{00000000-D21A-44E6-9681-60412CD8A1EF}"/>
+            </c:ext>
+          </c:extLst>
+        </c:ser>
+        <c:dLbls>
+          <c:showLegendKey val="0"/>
+          <c:showVal val="0"/>
+          <c:showCatName val="0"/>
+          <c:showSerName val="0"/>
+          <c:showPercent val="0"/>
+          <c:showBubbleSize val="0"/>
+        </c:dLbls>
+        <c:hiLowLines>
+          <c:spPr>
+            <a:ln w="9525" cap="flat" cmpd="sng" algn="ctr">
+              <a:solidFill>
+                <a:schemeClr val="tx1">
+                  <a:lumMod val="75000"/>
+                  <a:lumOff val="25000"/>
+                </a:schemeClr>
+              </a:solidFill>
+              <a:round/>
+            </a:ln>
+            <a:effectLst/>
+          </c:spPr>
+        </c:hiLowLines>
+        <c:smooth val="0"/>
+        <c:axId val="442130464"/>
+        <c:axId val="442122232"/>
+      </c:lineChart>
+      <c:catAx>
+        <c:axId val="442130464"/>
+        <c:scaling>
+          <c:orientation val="minMax"/>
+        </c:scaling>
+        <c:delete val="0"/>
+        <c:axPos val="b"/>
+        <c:title>
+          <c:tx>
+            <c:rich>
+              <a:bodyPr rot="0" spcFirstLastPara="1" vertOverflow="ellipsis" vert="horz" wrap="square" anchor="ctr" anchorCtr="1"/>
+              <a:lstStyle/>
+              <a:p>
+                <a:pPr>
+                  <a:defRPr sz="1000" b="1" i="0" u="none" strike="noStrike" kern="1200" baseline="0">
+                    <a:solidFill>
+                      <a:schemeClr val="tx1">
+                        <a:lumMod val="65000"/>
+                        <a:lumOff val="35000"/>
+                      </a:schemeClr>
+                    </a:solidFill>
+                    <a:latin typeface="+mn-lt"/>
+                    <a:ea typeface="+mn-ea"/>
+                    <a:cs typeface="+mn-cs"/>
+                  </a:defRPr>
+                </a:pPr>
+                <a:r>
+                  <a:rPr lang="en-US" b="1"/>
+                  <a:t>Tipos de Formaciones Vegetales (o Ecosistemas)</a:t>
+                </a:r>
+              </a:p>
+            </c:rich>
+          </c:tx>
+          <c:layout>
+            <c:manualLayout>
+              <c:xMode val="edge"/>
+              <c:yMode val="edge"/>
+              <c:x val="0.28174190726159232"/>
+              <c:y val="0.8981848153127201"/>
+            </c:manualLayout>
+          </c:layout>
+          <c:overlay val="0"/>
+          <c:spPr>
+            <a:noFill/>
+            <a:ln>
+              <a:noFill/>
+            </a:ln>
+            <a:effectLst/>
+          </c:spPr>
+          <c:txPr>
+            <a:bodyPr rot="0" spcFirstLastPara="1" vertOverflow="ellipsis" vert="horz" wrap="square" anchor="ctr" anchorCtr="1"/>
+            <a:lstStyle/>
+            <a:p>
+              <a:pPr>
+                <a:defRPr sz="1000" b="1" i="0" u="none" strike="noStrike" kern="1200" baseline="0">
+                  <a:solidFill>
+                    <a:schemeClr val="tx1">
+                      <a:lumMod val="65000"/>
+                      <a:lumOff val="35000"/>
+                    </a:schemeClr>
+                  </a:solidFill>
+                  <a:latin typeface="+mn-lt"/>
+                  <a:ea typeface="+mn-ea"/>
+                  <a:cs typeface="+mn-cs"/>
+                </a:defRPr>
+              </a:pPr>
+              <a:endParaRPr lang="es-ES"/>
+            </a:p>
+          </c:txPr>
+        </c:title>
+        <c:numFmt formatCode="General" sourceLinked="1"/>
+        <c:majorTickMark val="none"/>
+        <c:minorTickMark val="none"/>
+        <c:tickLblPos val="nextTo"/>
+        <c:spPr>
+          <a:noFill/>
+          <a:ln w="12700" cap="flat" cmpd="sng" algn="ctr">
+            <a:solidFill>
+              <a:schemeClr val="tx1">
+                <a:lumMod val="15000"/>
+                <a:lumOff val="85000"/>
+              </a:schemeClr>
+            </a:solidFill>
+            <a:round/>
+          </a:ln>
+          <a:effectLst/>
+        </c:spPr>
+        <c:txPr>
+          <a:bodyPr rot="-60000000" spcFirstLastPara="1" vertOverflow="ellipsis" vert="horz" wrap="square" anchor="ctr" anchorCtr="1"/>
+          <a:lstStyle/>
+          <a:p>
+            <a:pPr>
+              <a:defRPr sz="1000" b="0" i="0" u="none" strike="noStrike" kern="1200" baseline="0">
+                <a:solidFill>
+                  <a:schemeClr val="tx1">
+                    <a:lumMod val="65000"/>
+                    <a:lumOff val="35000"/>
+                  </a:schemeClr>
+                </a:solidFill>
+                <a:latin typeface="+mn-lt"/>
+                <a:ea typeface="+mn-ea"/>
+                <a:cs typeface="+mn-cs"/>
+              </a:defRPr>
+            </a:pPr>
+            <a:endParaRPr lang="es-ES"/>
+          </a:p>
+        </c:txPr>
+        <c:crossAx val="442122232"/>
+        <c:crosses val="autoZero"/>
+        <c:auto val="1"/>
+        <c:lblAlgn val="ctr"/>
+        <c:lblOffset val="100"/>
+        <c:noMultiLvlLbl val="0"/>
+      </c:catAx>
+      <c:valAx>
+        <c:axId val="442122232"/>
+        <c:scaling>
+          <c:orientation val="minMax"/>
+        </c:scaling>
+        <c:delete val="0"/>
+        <c:axPos val="l"/>
+        <c:majorGridlines>
+          <c:spPr>
+            <a:ln w="9525" cap="flat" cmpd="sng" algn="ctr">
+              <a:solidFill>
+                <a:schemeClr val="tx1">
+                  <a:lumMod val="15000"/>
+                  <a:lumOff val="85000"/>
+                </a:schemeClr>
+              </a:solidFill>
+              <a:round/>
+            </a:ln>
+            <a:effectLst/>
+          </c:spPr>
+        </c:majorGridlines>
+        <c:title>
+          <c:tx>
+            <c:rich>
+              <a:bodyPr rot="-5400000" spcFirstLastPara="1" vertOverflow="ellipsis" vert="horz" wrap="square" anchor="ctr" anchorCtr="1"/>
+              <a:lstStyle/>
+              <a:p>
+                <a:pPr>
+                  <a:defRPr sz="1000" b="1" i="0" u="none" strike="noStrike" kern="1200" baseline="0">
+                    <a:solidFill>
+                      <a:schemeClr val="tx1">
+                        <a:lumMod val="65000"/>
+                        <a:lumOff val="35000"/>
+                      </a:schemeClr>
+                    </a:solidFill>
+                    <a:latin typeface="+mn-lt"/>
+                    <a:ea typeface="+mn-ea"/>
+                    <a:cs typeface="+mn-cs"/>
+                  </a:defRPr>
+                </a:pPr>
+                <a:r>
+                  <a:rPr lang="en-US" b="1"/>
+                  <a:t>N Indv.</a:t>
+                </a:r>
+              </a:p>
+            </c:rich>
+          </c:tx>
+          <c:layout>
+            <c:manualLayout>
+              <c:xMode val="edge"/>
+              <c:yMode val="edge"/>
+              <c:x val="3.0555555555555555E-2"/>
+              <c:y val="0.39146661122805193"/>
+            </c:manualLayout>
+          </c:layout>
+          <c:overlay val="0"/>
+          <c:spPr>
+            <a:noFill/>
+            <a:ln>
+              <a:noFill/>
+            </a:ln>
+            <a:effectLst/>
+          </c:spPr>
+          <c:txPr>
+            <a:bodyPr rot="-5400000" spcFirstLastPara="1" vertOverflow="ellipsis" vert="horz" wrap="square" anchor="ctr" anchorCtr="1"/>
+            <a:lstStyle/>
+            <a:p>
+              <a:pPr>
+                <a:defRPr sz="1000" b="1" i="0" u="none" strike="noStrike" kern="1200" baseline="0">
+                  <a:solidFill>
+                    <a:schemeClr val="tx1">
+                      <a:lumMod val="65000"/>
+                      <a:lumOff val="35000"/>
+                    </a:schemeClr>
+                  </a:solidFill>
+                  <a:latin typeface="+mn-lt"/>
+                  <a:ea typeface="+mn-ea"/>
+                  <a:cs typeface="+mn-cs"/>
+                </a:defRPr>
+              </a:pPr>
+              <a:endParaRPr lang="es-ES"/>
+            </a:p>
+          </c:txPr>
+        </c:title>
+        <c:numFmt formatCode="General" sourceLinked="1"/>
+        <c:majorTickMark val="out"/>
+        <c:minorTickMark val="none"/>
+        <c:tickLblPos val="nextTo"/>
+        <c:spPr>
+          <a:noFill/>
+          <a:ln>
+            <a:noFill/>
+          </a:ln>
+          <a:effectLst/>
+        </c:spPr>
+        <c:txPr>
+          <a:bodyPr rot="-60000000" spcFirstLastPara="1" vertOverflow="ellipsis" vert="horz" wrap="square" anchor="ctr" anchorCtr="1"/>
+          <a:lstStyle/>
+          <a:p>
+            <a:pPr>
+              <a:defRPr sz="1000" b="0" i="0" u="none" strike="noStrike" kern="1200" baseline="0">
+                <a:solidFill>
+                  <a:schemeClr val="tx1">
+                    <a:lumMod val="65000"/>
+                    <a:lumOff val="35000"/>
+                  </a:schemeClr>
+                </a:solidFill>
+                <a:latin typeface="+mn-lt"/>
+                <a:ea typeface="+mn-ea"/>
+                <a:cs typeface="+mn-cs"/>
+              </a:defRPr>
+            </a:pPr>
+            <a:endParaRPr lang="es-ES"/>
+          </a:p>
+        </c:txPr>
+        <c:crossAx val="442130464"/>
+        <c:crosses val="autoZero"/>
+        <c:crossBetween val="between"/>
+      </c:valAx>
+      <c:spPr>
+        <a:noFill/>
+        <a:ln>
+          <a:noFill/>
+        </a:ln>
+        <a:effectLst/>
+      </c:spPr>
+    </c:plotArea>
+    <c:plotVisOnly val="1"/>
+    <c:dispBlanksAs val="gap"/>
+    <c:showDLblsOverMax val="0"/>
+  </c:chart>
+  <c:spPr>
+    <a:noFill/>
+    <a:ln>
+      <a:noFill/>
+    </a:ln>
+    <a:effectLst/>
+  </c:spPr>
+  <c:txPr>
+    <a:bodyPr/>
+    <a:lstStyle/>
+    <a:p>
+      <a:pPr>
+        <a:defRPr sz="1000"/>
+      </a:pPr>
+      <a:endParaRPr lang="es-ES"/>
+    </a:p>
+  </c:txPr>
+  <c:externalData r:id="rId3">
+    <c:autoUpdate val="0"/>
+  </c:externalData>
+</c:chartSpace>
+</file>
+
 <file path=ppt/charts/colors1.xml><?xml version="1.0" encoding="utf-8"?>
 <cs:colorStyle xmlns:cs="http://schemas.microsoft.com/office/drawing/2012/chartStyle" xmlns:a="http://schemas.openxmlformats.org/drawingml/2006/main" meth="withinLinear" id="17">
   <a:schemeClr val="accent4"/>
 </cs:colorStyle>
 </file>
 
+<file path=ppt/charts/colors2.xml><?xml version="1.0" encoding="utf-8"?>
+<cs:colorStyle xmlns:cs="http://schemas.microsoft.com/office/drawing/2012/chartStyle" xmlns:a="http://schemas.openxmlformats.org/drawingml/2006/main" meth="cycle" id="12">
+  <a:schemeClr val="accent2"/>
+  <a:schemeClr val="accent4"/>
+  <a:schemeClr val="accent6"/>
+  <cs:variation/>
+  <cs:variation>
+    <a:lumMod val="60000"/>
+  </cs:variation>
+  <cs:variation>
+    <a:lumMod val="80000"/>
+    <a:lumOff val="20000"/>
+  </cs:variation>
+  <cs:variation>
+    <a:lumMod val="80000"/>
+  </cs:variation>
+  <cs:variation>
+    <a:lumMod val="60000"/>
+    <a:lumOff val="40000"/>
+  </cs:variation>
+  <cs:variation>
+    <a:lumMod val="50000"/>
+  </cs:variation>
+  <cs:variation>
+    <a:lumMod val="70000"/>
+    <a:lumOff val="30000"/>
+  </cs:variation>
+  <cs:variation>
+    <a:lumMod val="70000"/>
+  </cs:variation>
+  <cs:variation>
+    <a:lumMod val="50000"/>
+    <a:lumOff val="50000"/>
+  </cs:variation>
+</cs:colorStyle>
+</file>
+
 <file path=ppt/charts/style1.xml><?xml version="1.0" encoding="utf-8"?>
+<cs:chartStyle xmlns:cs="http://schemas.microsoft.com/office/drawing/2012/chartStyle" xmlns:a="http://schemas.openxmlformats.org/drawingml/2006/main" id="342">
+  <cs:axisTitle>
+    <cs:lnRef idx="0"/>
+    <cs:fillRef idx="0"/>
+    <cs:effectRef idx="0"/>
+    <cs:fontRef idx="minor">
+      <a:schemeClr val="tx1">
+        <a:lumMod val="65000"/>
+        <a:lumOff val="35000"/>
+      </a:schemeClr>
+    </cs:fontRef>
+    <cs:defRPr sz="900" kern="1200"/>
+  </cs:axisTitle>
+  <cs:categoryAxis>
+    <cs:lnRef idx="0"/>
+    <cs:fillRef idx="0"/>
+    <cs:effectRef idx="0"/>
+    <cs:fontRef idx="minor">
+      <a:schemeClr val="tx1">
+        <a:lumMod val="65000"/>
+        <a:lumOff val="35000"/>
+      </a:schemeClr>
+    </cs:fontRef>
+    <cs:spPr>
+      <a:ln w="12700" cap="flat" cmpd="sng" algn="ctr">
+        <a:solidFill>
+          <a:schemeClr val="tx1">
+            <a:lumMod val="15000"/>
+            <a:lumOff val="85000"/>
+          </a:schemeClr>
+        </a:solidFill>
+        <a:round/>
+      </a:ln>
+    </cs:spPr>
+    <cs:defRPr sz="900" kern="1200"/>
+  </cs:categoryAxis>
+  <cs:chartArea mods="allowNoFillOverride allowNoLineOverride">
+    <cs:lnRef idx="0"/>
+    <cs:fillRef idx="0"/>
+    <cs:effectRef idx="0"/>
+    <cs:fontRef idx="minor">
+      <a:schemeClr val="tx2"/>
+    </cs:fontRef>
+    <cs:spPr>
+      <a:solidFill>
+        <a:schemeClr val="bg1"/>
+      </a:solidFill>
+      <a:ln w="9525" cap="flat" cmpd="sng" algn="ctr">
+        <a:solidFill>
+          <a:schemeClr val="tx1">
+            <a:lumMod val="15000"/>
+            <a:lumOff val="85000"/>
+          </a:schemeClr>
+        </a:solidFill>
+        <a:round/>
+      </a:ln>
+    </cs:spPr>
+    <cs:defRPr sz="900" kern="1200"/>
+  </cs:chartArea>
+  <cs:dataLabel>
+    <cs:lnRef idx="0"/>
+    <cs:fillRef idx="0"/>
+    <cs:effectRef idx="0"/>
+    <cs:fontRef idx="minor">
+      <a:schemeClr val="tx1">
+        <a:lumMod val="75000"/>
+        <a:lumOff val="25000"/>
+      </a:schemeClr>
+    </cs:fontRef>
+    <cs:defRPr sz="900" kern="1200"/>
+  </cs:dataLabel>
+  <cs:dataLabelCallout>
+    <cs:lnRef idx="0"/>
+    <cs:fillRef idx="0"/>
+    <cs:effectRef idx="0"/>
+    <cs:fontRef idx="minor">
+      <a:schemeClr val="dk1">
+        <a:lumMod val="65000"/>
+        <a:lumOff val="35000"/>
+      </a:schemeClr>
+    </cs:fontRef>
+    <cs:spPr>
+      <a:solidFill>
+        <a:schemeClr val="lt1"/>
+      </a:solidFill>
+      <a:ln>
+        <a:solidFill>
+          <a:schemeClr val="dk1">
+            <a:lumMod val="25000"/>
+            <a:lumOff val="75000"/>
+          </a:schemeClr>
+        </a:solidFill>
+      </a:ln>
+    </cs:spPr>
+    <cs:defRPr sz="900" kern="1200"/>
+    <cs:bodyPr rot="0" spcFirstLastPara="1" vertOverflow="clip" horzOverflow="clip" vert="horz" wrap="square" lIns="36576" tIns="18288" rIns="36576" bIns="18288" anchor="ctr" anchorCtr="1">
+      <a:spAutoFit/>
+    </cs:bodyPr>
+  </cs:dataLabelCallout>
+  <cs:dataPoint>
+    <cs:lnRef idx="0"/>
+    <cs:fillRef idx="3">
+      <cs:styleClr val="auto"/>
+    </cs:fillRef>
+    <cs:effectRef idx="3"/>
+    <cs:fontRef idx="minor">
+      <a:schemeClr val="tx1"/>
+    </cs:fontRef>
+  </cs:dataPoint>
+  <cs:dataPoint3D>
+    <cs:lnRef idx="0"/>
+    <cs:fillRef idx="3">
+      <cs:styleClr val="auto"/>
+    </cs:fillRef>
+    <cs:effectRef idx="3"/>
+    <cs:fontRef idx="minor">
+      <a:schemeClr val="tx1"/>
+    </cs:fontRef>
+  </cs:dataPoint3D>
+  <cs:dataPointLine>
+    <cs:lnRef idx="0">
+      <cs:styleClr val="auto"/>
+    </cs:lnRef>
+    <cs:fillRef idx="3"/>
+    <cs:effectRef idx="3"/>
+    <cs:fontRef idx="minor">
+      <a:schemeClr val="tx1"/>
+    </cs:fontRef>
+    <cs:spPr>
+      <a:ln w="34925" cap="rnd">
+        <a:solidFill>
+          <a:schemeClr val="phClr"/>
+        </a:solidFill>
+        <a:round/>
+      </a:ln>
+    </cs:spPr>
+  </cs:dataPointLine>
+  <cs:dataPointMarker>
+    <cs:lnRef idx="0">
+      <cs:styleClr val="auto"/>
+    </cs:lnRef>
+    <cs:fillRef idx="3">
+      <cs:styleClr val="auto"/>
+    </cs:fillRef>
+    <cs:effectRef idx="3"/>
+    <cs:fontRef idx="minor">
+      <a:schemeClr val="tx1"/>
+    </cs:fontRef>
+    <cs:spPr>
+      <a:ln w="9525">
+        <a:solidFill>
+          <a:schemeClr val="phClr"/>
+        </a:solidFill>
+        <a:round/>
+      </a:ln>
+    </cs:spPr>
+  </cs:dataPointMarker>
+  <cs:dataPointMarkerLayout symbol="circle" size="6"/>
+  <cs:dataPointWireframe>
+    <cs:lnRef idx="0">
+      <cs:styleClr val="auto"/>
+    </cs:lnRef>
+    <cs:fillRef idx="3"/>
+    <cs:effectRef idx="3"/>
+    <cs:fontRef idx="minor">
+      <a:schemeClr val="tx1"/>
+    </cs:fontRef>
+    <cs:spPr>
+      <a:ln w="9525" cap="rnd">
+        <a:solidFill>
+          <a:schemeClr val="phClr"/>
+        </a:solidFill>
+        <a:round/>
+      </a:ln>
+    </cs:spPr>
+  </cs:dataPointWireframe>
+  <cs:dataTable>
+    <cs:lnRef idx="0"/>
+    <cs:fillRef idx="0"/>
+    <cs:effectRef idx="0"/>
+    <cs:fontRef idx="minor">
+      <a:schemeClr val="tx1">
+        <a:lumMod val="65000"/>
+        <a:lumOff val="35000"/>
+      </a:schemeClr>
+    </cs:fontRef>
+    <cs:spPr>
+      <a:noFill/>
+      <a:ln w="9525" cap="flat" cmpd="sng" algn="ctr">
+        <a:solidFill>
+          <a:schemeClr val="tx1">
+            <a:lumMod val="15000"/>
+            <a:lumOff val="85000"/>
+          </a:schemeClr>
+        </a:solidFill>
+        <a:round/>
+      </a:ln>
+    </cs:spPr>
+    <cs:defRPr sz="900" kern="1200"/>
+  </cs:dataTable>
+  <cs:downBar>
+    <cs:lnRef idx="0"/>
+    <cs:fillRef idx="0"/>
+    <cs:effectRef idx="0"/>
+    <cs:fontRef idx="minor">
+      <a:schemeClr val="dk1"/>
+    </cs:fontRef>
+    <cs:spPr>
+      <a:solidFill>
+        <a:schemeClr val="dk1">
+          <a:lumMod val="65000"/>
+          <a:lumOff val="35000"/>
+        </a:schemeClr>
+      </a:solidFill>
+      <a:ln w="9525">
+        <a:solidFill>
+          <a:schemeClr val="tx1">
+            <a:lumMod val="65000"/>
+            <a:lumOff val="35000"/>
+          </a:schemeClr>
+        </a:solidFill>
+      </a:ln>
+    </cs:spPr>
+  </cs:downBar>
+  <cs:dropLine>
+    <cs:lnRef idx="0"/>
+    <cs:fillRef idx="0"/>
+    <cs:effectRef idx="0"/>
+    <cs:fontRef idx="minor">
+      <a:schemeClr val="tx1"/>
+    </cs:fontRef>
+    <cs:spPr>
+      <a:ln w="9525" cap="flat" cmpd="sng" algn="ctr">
+        <a:solidFill>
+          <a:schemeClr val="tx1">
+            <a:lumMod val="35000"/>
+            <a:lumOff val="65000"/>
+          </a:schemeClr>
+        </a:solidFill>
+        <a:round/>
+      </a:ln>
+    </cs:spPr>
+  </cs:dropLine>
+  <cs:errorBar>
+    <cs:lnRef idx="0"/>
+    <cs:fillRef idx="0"/>
+    <cs:effectRef idx="0"/>
+    <cs:fontRef idx="minor">
+      <a:schemeClr val="tx1"/>
+    </cs:fontRef>
+    <cs:spPr>
+      <a:ln w="9525" cap="flat" cmpd="sng" algn="ctr">
+        <a:solidFill>
+          <a:schemeClr val="tx1">
+            <a:lumMod val="65000"/>
+            <a:lumOff val="35000"/>
+          </a:schemeClr>
+        </a:solidFill>
+        <a:round/>
+      </a:ln>
+    </cs:spPr>
+  </cs:errorBar>
+  <cs:floor>
+    <cs:lnRef idx="0"/>
+    <cs:fillRef idx="0"/>
+    <cs:effectRef idx="0"/>
+    <cs:fontRef idx="minor">
+      <a:schemeClr val="lt1"/>
+    </cs:fontRef>
+  </cs:floor>
+  <cs:gridlineMajor>
+    <cs:lnRef idx="0"/>
+    <cs:fillRef idx="0"/>
+    <cs:effectRef idx="0"/>
+    <cs:fontRef idx="minor">
+      <a:schemeClr val="tx1"/>
+    </cs:fontRef>
+    <cs:spPr>
+      <a:ln w="9525" cap="flat" cmpd="sng" algn="ctr">
+        <a:solidFill>
+          <a:schemeClr val="tx1">
+            <a:lumMod val="15000"/>
+            <a:lumOff val="85000"/>
+          </a:schemeClr>
+        </a:solidFill>
+        <a:round/>
+      </a:ln>
+    </cs:spPr>
+  </cs:gridlineMajor>
+  <cs:gridlineMinor>
+    <cs:lnRef idx="0"/>
+    <cs:fillRef idx="0"/>
+    <cs:effectRef idx="0"/>
+    <cs:fontRef idx="minor">
+      <a:schemeClr val="tx1"/>
+    </cs:fontRef>
+    <cs:spPr>
+      <a:ln w="9525" cap="flat" cmpd="sng" algn="ctr">
+        <a:solidFill>
+          <a:schemeClr val="tx1">
+            <a:lumMod val="5000"/>
+            <a:lumOff val="95000"/>
+          </a:schemeClr>
+        </a:solidFill>
+        <a:round/>
+      </a:ln>
+    </cs:spPr>
+  </cs:gridlineMinor>
+  <cs:hiLoLine>
+    <cs:lnRef idx="0"/>
+    <cs:fillRef idx="0"/>
+    <cs:effectRef idx="0"/>
+    <cs:fontRef idx="minor">
+      <a:schemeClr val="tx1"/>
+    </cs:fontRef>
+    <cs:spPr>
+      <a:ln w="9525" cap="flat" cmpd="sng" algn="ctr">
+        <a:solidFill>
+          <a:schemeClr val="tx1">
+            <a:lumMod val="75000"/>
+            <a:lumOff val="25000"/>
+          </a:schemeClr>
+        </a:solidFill>
+        <a:round/>
+      </a:ln>
+    </cs:spPr>
+  </cs:hiLoLine>
+  <cs:leaderLine>
+    <cs:lnRef idx="0"/>
+    <cs:fillRef idx="0"/>
+    <cs:effectRef idx="0"/>
+    <cs:fontRef idx="minor">
+      <a:schemeClr val="tx1"/>
+    </cs:fontRef>
+    <cs:spPr>
+      <a:ln w="9525" cap="flat" cmpd="sng" algn="ctr">
+        <a:solidFill>
+          <a:schemeClr val="tx1">
+            <a:lumMod val="35000"/>
+            <a:lumOff val="65000"/>
+          </a:schemeClr>
+        </a:solidFill>
+        <a:round/>
+      </a:ln>
+    </cs:spPr>
+  </cs:leaderLine>
+  <cs:legend>
+    <cs:lnRef idx="0"/>
+    <cs:fillRef idx="0"/>
+    <cs:effectRef idx="0"/>
+    <cs:fontRef idx="minor">
+      <a:schemeClr val="tx1">
+        <a:lumMod val="65000"/>
+        <a:lumOff val="35000"/>
+      </a:schemeClr>
+    </cs:fontRef>
+    <cs:defRPr sz="900" kern="1200"/>
+  </cs:legend>
+  <cs:plotArea>
+    <cs:lnRef idx="0"/>
+    <cs:fillRef idx="0"/>
+    <cs:effectRef idx="0"/>
+    <cs:fontRef idx="minor">
+      <a:schemeClr val="lt1"/>
+    </cs:fontRef>
+  </cs:plotArea>
+  <cs:plotArea3D>
+    <cs:lnRef idx="0"/>
+    <cs:fillRef idx="0"/>
+    <cs:effectRef idx="0"/>
+    <cs:fontRef idx="minor">
+      <a:schemeClr val="lt1"/>
+    </cs:fontRef>
+  </cs:plotArea3D>
+  <cs:seriesAxis>
+    <cs:lnRef idx="0"/>
+    <cs:fillRef idx="0"/>
+    <cs:effectRef idx="0"/>
+    <cs:fontRef idx="minor">
+      <a:schemeClr val="tx1">
+        <a:lumMod val="65000"/>
+        <a:lumOff val="35000"/>
+      </a:schemeClr>
+    </cs:fontRef>
+    <cs:spPr>
+      <a:ln w="12700" cap="flat" cmpd="sng" algn="ctr">
+        <a:solidFill>
+          <a:schemeClr val="tx1">
+            <a:lumMod val="15000"/>
+            <a:lumOff val="85000"/>
+          </a:schemeClr>
+        </a:solidFill>
+        <a:round/>
+      </a:ln>
+    </cs:spPr>
+    <cs:defRPr sz="900" kern="1200"/>
+  </cs:seriesAxis>
+  <cs:seriesLine>
+    <cs:lnRef idx="0"/>
+    <cs:fillRef idx="0"/>
+    <cs:effectRef idx="0"/>
+    <cs:fontRef idx="minor">
+      <a:schemeClr val="tx1"/>
+    </cs:fontRef>
+    <cs:spPr>
+      <a:ln w="9525" cap="flat" cmpd="sng" algn="ctr">
+        <a:solidFill>
+          <a:schemeClr val="tx1">
+            <a:lumMod val="35000"/>
+            <a:lumOff val="65000"/>
+          </a:schemeClr>
+        </a:solidFill>
+        <a:round/>
+      </a:ln>
+    </cs:spPr>
+  </cs:seriesLine>
+  <cs:title>
+    <cs:lnRef idx="0"/>
+    <cs:fillRef idx="0"/>
+    <cs:effectRef idx="0"/>
+    <cs:fontRef idx="minor">
+      <a:schemeClr val="tx1">
+        <a:lumMod val="65000"/>
+        <a:lumOff val="35000"/>
+      </a:schemeClr>
+    </cs:fontRef>
+    <cs:defRPr sz="1600" b="1" kern="1200" baseline="0"/>
+  </cs:title>
+  <cs:trendline>
+    <cs:lnRef idx="0">
+      <cs:styleClr val="auto"/>
+    </cs:lnRef>
+    <cs:fillRef idx="0"/>
+    <cs:effectRef idx="0"/>
+    <cs:fontRef idx="minor">
+      <a:schemeClr val="lt1"/>
+    </cs:fontRef>
+    <cs:spPr>
+      <a:ln w="19050" cap="rnd">
+        <a:solidFill>
+          <a:schemeClr val="phClr"/>
+        </a:solidFill>
+      </a:ln>
+    </cs:spPr>
+  </cs:trendline>
+  <cs:trendlineLabel>
+    <cs:lnRef idx="0"/>
+    <cs:fillRef idx="0"/>
+    <cs:effectRef idx="0"/>
+    <cs:fontRef idx="minor">
+      <a:schemeClr val="tx1">
+        <a:lumMod val="65000"/>
+        <a:lumOff val="35000"/>
+      </a:schemeClr>
+    </cs:fontRef>
+    <cs:defRPr sz="900" kern="1200"/>
+  </cs:trendlineLabel>
+  <cs:upBar>
+    <cs:lnRef idx="0"/>
+    <cs:fillRef idx="0"/>
+    <cs:effectRef idx="0"/>
+    <cs:fontRef idx="minor">
+      <a:schemeClr val="dk1"/>
+    </cs:fontRef>
+    <cs:spPr>
+      <a:solidFill>
+        <a:schemeClr val="lt1"/>
+      </a:solidFill>
+      <a:ln w="9525">
+        <a:solidFill>
+          <a:schemeClr val="tx1">
+            <a:lumMod val="15000"/>
+            <a:lumOff val="85000"/>
+          </a:schemeClr>
+        </a:solidFill>
+      </a:ln>
+    </cs:spPr>
+  </cs:upBar>
+  <cs:valueAxis>
+    <cs:lnRef idx="0"/>
+    <cs:fillRef idx="0"/>
+    <cs:effectRef idx="0"/>
+    <cs:fontRef idx="minor">
+      <a:schemeClr val="tx1">
+        <a:lumMod val="65000"/>
+        <a:lumOff val="35000"/>
+      </a:schemeClr>
+    </cs:fontRef>
+    <cs:defRPr sz="900" kern="1200"/>
+  </cs:valueAxis>
+  <cs:wall>
+    <cs:lnRef idx="0"/>
+    <cs:fillRef idx="0"/>
+    <cs:effectRef idx="0"/>
+    <cs:fontRef idx="minor">
+      <a:schemeClr val="lt1"/>
+    </cs:fontRef>
+  </cs:wall>
+</cs:chartStyle>
+</file>
+
+<file path=ppt/charts/style2.xml><?xml version="1.0" encoding="utf-8"?>
 <cs:chartStyle xmlns:cs="http://schemas.microsoft.com/office/drawing/2012/chartStyle" xmlns:a="http://schemas.openxmlformats.org/drawingml/2006/main" id="342">
   <cs:axisTitle>
     <cs:lnRef idx="0"/>
@@ -5416,6 +6458,3088 @@
 </p:sld>
 </file>
 
+<file path=ppt/slides/slide2.xml><?xml version="1.0" encoding="utf-8"?>
+<p:sld xmlns:a="http://schemas.openxmlformats.org/drawingml/2006/main" xmlns:r="http://schemas.openxmlformats.org/officeDocument/2006/relationships" xmlns:p="http://schemas.openxmlformats.org/presentationml/2006/main">
+  <p:cSld>
+    <p:spTree>
+      <p:nvGrpSpPr>
+        <p:cNvPr id="1" name=""/>
+        <p:cNvGrpSpPr/>
+        <p:nvPr/>
+      </p:nvGrpSpPr>
+      <p:grpSpPr>
+        <a:xfrm>
+          <a:off x="0" y="0"/>
+          <a:ext cx="0" cy="0"/>
+          <a:chOff x="0" y="0"/>
+          <a:chExt cx="0" cy="0"/>
+        </a:xfrm>
+      </p:grpSpPr>
+      <p:sp>
+        <p:nvSpPr>
+          <p:cNvPr id="4" name="object 2"/>
+          <p:cNvSpPr/>
+          <p:nvPr/>
+        </p:nvSpPr>
+        <p:spPr>
+          <a:xfrm>
+            <a:off x="1524000" y="1"/>
+            <a:ext cx="9144000" cy="6857999"/>
+          </a:xfrm>
+          <a:prstGeom prst="rect">
+            <a:avLst/>
+          </a:prstGeom>
+          <a:blipFill>
+            <a:blip r:embed="rId2" cstate="print"/>
+            <a:stretch>
+              <a:fillRect/>
+            </a:stretch>
+          </a:blipFill>
+        </p:spPr>
+        <p:txBody>
+          <a:bodyPr wrap="square" lIns="0" tIns="0" rIns="0" bIns="0" rtlCol="0"/>
+          <a:lstStyle/>
+          <a:p>
+            <a:endParaRPr>
+              <a:solidFill>
+                <a:prstClr val="black"/>
+              </a:solidFill>
+              <a:latin typeface="Calibri"/>
+            </a:endParaRPr>
+          </a:p>
+        </p:txBody>
+      </p:sp>
+      <p:graphicFrame>
+        <p:nvGraphicFramePr>
+          <p:cNvPr id="2" name="Tabla 1"/>
+          <p:cNvGraphicFramePr>
+            <a:graphicFrameLocks noGrp="1"/>
+          </p:cNvGraphicFramePr>
+          <p:nvPr/>
+        </p:nvGraphicFramePr>
+        <p:xfrm>
+          <a:off x="2514600" y="984484"/>
+          <a:ext cx="5130800" cy="2493645"/>
+        </p:xfrm>
+        <a:graphic>
+          <a:graphicData uri="http://schemas.openxmlformats.org/drawingml/2006/table">
+            <a:tbl>
+              <a:tblPr/>
+              <a:tblGrid>
+                <a:gridCol w="1178911">
+                  <a:extLst>
+                    <a:ext uri="{9D8B030D-6E8A-4147-A177-3AD203B41FA5}">
+                      <a16:colId xmlns:a16="http://schemas.microsoft.com/office/drawing/2014/main" val="20000"/>
+                    </a:ext>
+                  </a:extLst>
+                </a:gridCol>
+                <a:gridCol w="1055316">
+                  <a:extLst>
+                    <a:ext uri="{9D8B030D-6E8A-4147-A177-3AD203B41FA5}">
+                      <a16:colId xmlns:a16="http://schemas.microsoft.com/office/drawing/2014/main" val="20001"/>
+                    </a:ext>
+                  </a:extLst>
+                </a:gridCol>
+                <a:gridCol w="1093345">
+                  <a:extLst>
+                    <a:ext uri="{9D8B030D-6E8A-4147-A177-3AD203B41FA5}">
+                      <a16:colId xmlns:a16="http://schemas.microsoft.com/office/drawing/2014/main" val="20002"/>
+                    </a:ext>
+                  </a:extLst>
+                </a:gridCol>
+                <a:gridCol w="938059">
+                  <a:extLst>
+                    <a:ext uri="{9D8B030D-6E8A-4147-A177-3AD203B41FA5}">
+                      <a16:colId xmlns:a16="http://schemas.microsoft.com/office/drawing/2014/main" val="20003"/>
+                    </a:ext>
+                  </a:extLst>
+                </a:gridCol>
+                <a:gridCol w="865169">
+                  <a:extLst>
+                    <a:ext uri="{9D8B030D-6E8A-4147-A177-3AD203B41FA5}">
+                      <a16:colId xmlns:a16="http://schemas.microsoft.com/office/drawing/2014/main" val="20004"/>
+                    </a:ext>
+                  </a:extLst>
+                </a:gridCol>
+              </a:tblGrid>
+              <a:tr h="381000">
+                <a:tc>
+                  <a:txBody>
+                    <a:bodyPr/>
+                    <a:lstStyle/>
+                    <a:p>
+                      <a:pPr algn="l" fontAlgn="b"/>
+                      <a:r>
+                        <a:rPr lang="es-ES" sz="1200" b="1" i="0" u="none" strike="noStrike" dirty="0">
+                          <a:solidFill>
+                            <a:srgbClr val="000000"/>
+                          </a:solidFill>
+                          <a:effectLst/>
+                          <a:latin typeface="Calibri" panose="020F0502020204030204" pitchFamily="34" charset="0"/>
+                        </a:rPr>
+                        <a:t>Ecosistemas</a:t>
+                      </a:r>
+                    </a:p>
+                  </a:txBody>
+                  <a:tcPr marL="9525" marR="9525" marT="9525" marB="0" anchor="b">
+                    <a:lnL w="6350" cap="flat" cmpd="sng" algn="ctr">
+                      <a:solidFill>
+                        <a:srgbClr val="000000"/>
+                      </a:solidFill>
+                      <a:prstDash val="solid"/>
+                      <a:round/>
+                      <a:headEnd type="none" w="med" len="med"/>
+                      <a:tailEnd type="none" w="med" len="med"/>
+                    </a:lnL>
+                    <a:lnR w="6350" cap="flat" cmpd="sng" algn="ctr">
+                      <a:solidFill>
+                        <a:srgbClr val="000000"/>
+                      </a:solidFill>
+                      <a:prstDash val="solid"/>
+                      <a:round/>
+                      <a:headEnd type="none" w="med" len="med"/>
+                      <a:tailEnd type="none" w="med" len="med"/>
+                    </a:lnR>
+                    <a:lnT w="6350" cap="flat" cmpd="sng" algn="ctr">
+                      <a:solidFill>
+                        <a:srgbClr val="000000"/>
+                      </a:solidFill>
+                      <a:prstDash val="solid"/>
+                      <a:round/>
+                      <a:headEnd type="none" w="med" len="med"/>
+                      <a:tailEnd type="none" w="med" len="med"/>
+                    </a:lnT>
+                    <a:lnB w="6350" cap="flat" cmpd="sng" algn="ctr">
+                      <a:solidFill>
+                        <a:srgbClr val="000000"/>
+                      </a:solidFill>
+                      <a:prstDash val="solid"/>
+                      <a:round/>
+                      <a:headEnd type="none" w="med" len="med"/>
+                      <a:tailEnd type="none" w="med" len="med"/>
+                    </a:lnB>
+                  </a:tcPr>
+                </a:tc>
+                <a:tc>
+                  <a:txBody>
+                    <a:bodyPr/>
+                    <a:lstStyle/>
+                    <a:p>
+                      <a:pPr algn="ctr" fontAlgn="ctr"/>
+                      <a:r>
+                        <a:rPr lang="es-ES" sz="1200" b="1" i="1" u="none" strike="noStrike" dirty="0">
+                          <a:solidFill>
+                            <a:srgbClr val="000000"/>
+                          </a:solidFill>
+                          <a:effectLst/>
+                          <a:latin typeface="Calibri" panose="020F0502020204030204" pitchFamily="34" charset="0"/>
+                        </a:rPr>
+                        <a:t>Anas bahamensis</a:t>
+                      </a:r>
+                    </a:p>
+                  </a:txBody>
+                  <a:tcPr marL="9525" marR="9525" marT="9525" marB="0" anchor="ctr">
+                    <a:lnL w="6350" cap="flat" cmpd="sng" algn="ctr">
+                      <a:solidFill>
+                        <a:srgbClr val="000000"/>
+                      </a:solidFill>
+                      <a:prstDash val="solid"/>
+                      <a:round/>
+                      <a:headEnd type="none" w="med" len="med"/>
+                      <a:tailEnd type="none" w="med" len="med"/>
+                    </a:lnL>
+                    <a:lnR w="6350" cap="flat" cmpd="sng" algn="ctr">
+                      <a:solidFill>
+                        <a:srgbClr val="000000"/>
+                      </a:solidFill>
+                      <a:prstDash val="solid"/>
+                      <a:round/>
+                      <a:headEnd type="none" w="med" len="med"/>
+                      <a:tailEnd type="none" w="med" len="med"/>
+                    </a:lnR>
+                    <a:lnT w="6350" cap="flat" cmpd="sng" algn="ctr">
+                      <a:solidFill>
+                        <a:srgbClr val="000000"/>
+                      </a:solidFill>
+                      <a:prstDash val="solid"/>
+                      <a:round/>
+                      <a:headEnd type="none" w="med" len="med"/>
+                      <a:tailEnd type="none" w="med" len="med"/>
+                    </a:lnT>
+                    <a:lnB w="6350" cap="flat" cmpd="sng" algn="ctr">
+                      <a:solidFill>
+                        <a:srgbClr val="000000"/>
+                      </a:solidFill>
+                      <a:prstDash val="solid"/>
+                      <a:round/>
+                      <a:headEnd type="none" w="med" len="med"/>
+                      <a:tailEnd type="none" w="med" len="med"/>
+                    </a:lnB>
+                  </a:tcPr>
+                </a:tc>
+                <a:tc>
+                  <a:txBody>
+                    <a:bodyPr/>
+                    <a:lstStyle/>
+                    <a:p>
+                      <a:pPr algn="ctr" fontAlgn="ctr"/>
+                      <a:r>
+                        <a:rPr lang="es-ES" sz="1200" b="1" i="0" u="none" strike="noStrike">
+                          <a:solidFill>
+                            <a:srgbClr val="000000"/>
+                          </a:solidFill>
+                          <a:effectLst/>
+                          <a:latin typeface="Calibri" panose="020F0502020204030204" pitchFamily="34" charset="0"/>
+                        </a:rPr>
+                        <a:t>pi = ni/N</a:t>
+                      </a:r>
+                    </a:p>
+                  </a:txBody>
+                  <a:tcPr marL="9525" marR="9525" marT="9525" marB="0" anchor="ctr">
+                    <a:lnL w="6350" cap="flat" cmpd="sng" algn="ctr">
+                      <a:solidFill>
+                        <a:srgbClr val="000000"/>
+                      </a:solidFill>
+                      <a:prstDash val="solid"/>
+                      <a:round/>
+                      <a:headEnd type="none" w="med" len="med"/>
+                      <a:tailEnd type="none" w="med" len="med"/>
+                    </a:lnL>
+                    <a:lnR w="6350" cap="flat" cmpd="sng" algn="ctr">
+                      <a:solidFill>
+                        <a:srgbClr val="000000"/>
+                      </a:solidFill>
+                      <a:prstDash val="solid"/>
+                      <a:round/>
+                      <a:headEnd type="none" w="med" len="med"/>
+                      <a:tailEnd type="none" w="med" len="med"/>
+                    </a:lnR>
+                    <a:lnT w="6350" cap="flat" cmpd="sng" algn="ctr">
+                      <a:solidFill>
+                        <a:srgbClr val="000000"/>
+                      </a:solidFill>
+                      <a:prstDash val="solid"/>
+                      <a:round/>
+                      <a:headEnd type="none" w="med" len="med"/>
+                      <a:tailEnd type="none" w="med" len="med"/>
+                    </a:lnT>
+                    <a:lnB w="6350" cap="flat" cmpd="sng" algn="ctr">
+                      <a:solidFill>
+                        <a:srgbClr val="000000"/>
+                      </a:solidFill>
+                      <a:prstDash val="solid"/>
+                      <a:round/>
+                      <a:headEnd type="none" w="med" len="med"/>
+                      <a:tailEnd type="none" w="med" len="med"/>
+                    </a:lnB>
+                  </a:tcPr>
+                </a:tc>
+                <a:tc>
+                  <a:txBody>
+                    <a:bodyPr/>
+                    <a:lstStyle/>
+                    <a:p>
+                      <a:pPr algn="ctr" fontAlgn="ctr"/>
+                      <a:r>
+                        <a:rPr lang="es-ES" sz="1200" b="1" i="0" u="none" strike="noStrike">
+                          <a:solidFill>
+                            <a:srgbClr val="000000"/>
+                          </a:solidFill>
+                          <a:effectLst/>
+                          <a:latin typeface="Calibri" panose="020F0502020204030204" pitchFamily="34" charset="0"/>
+                        </a:rPr>
+                        <a:t>pi2</a:t>
+                      </a:r>
+                    </a:p>
+                  </a:txBody>
+                  <a:tcPr marL="9525" marR="9525" marT="9525" marB="0" anchor="ctr">
+                    <a:lnL w="6350" cap="flat" cmpd="sng" algn="ctr">
+                      <a:solidFill>
+                        <a:srgbClr val="000000"/>
+                      </a:solidFill>
+                      <a:prstDash val="solid"/>
+                      <a:round/>
+                      <a:headEnd type="none" w="med" len="med"/>
+                      <a:tailEnd type="none" w="med" len="med"/>
+                    </a:lnL>
+                    <a:lnR w="6350" cap="flat" cmpd="sng" algn="ctr">
+                      <a:solidFill>
+                        <a:srgbClr val="000000"/>
+                      </a:solidFill>
+                      <a:prstDash val="solid"/>
+                      <a:round/>
+                      <a:headEnd type="none" w="med" len="med"/>
+                      <a:tailEnd type="none" w="med" len="med"/>
+                    </a:lnR>
+                    <a:lnT w="6350" cap="flat" cmpd="sng" algn="ctr">
+                      <a:solidFill>
+                        <a:srgbClr val="000000"/>
+                      </a:solidFill>
+                      <a:prstDash val="solid"/>
+                      <a:round/>
+                      <a:headEnd type="none" w="med" len="med"/>
+                      <a:tailEnd type="none" w="med" len="med"/>
+                    </a:lnT>
+                    <a:lnB w="6350" cap="flat" cmpd="sng" algn="ctr">
+                      <a:solidFill>
+                        <a:srgbClr val="000000"/>
+                      </a:solidFill>
+                      <a:prstDash val="solid"/>
+                      <a:round/>
+                      <a:headEnd type="none" w="med" len="med"/>
+                      <a:tailEnd type="none" w="med" len="med"/>
+                    </a:lnB>
+                  </a:tcPr>
+                </a:tc>
+                <a:tc>
+                  <a:txBody>
+                    <a:bodyPr/>
+                    <a:lstStyle/>
+                    <a:p>
+                      <a:pPr algn="l" fontAlgn="b"/>
+                      <a:endParaRPr lang="es-ES" sz="1200" b="0" i="0" u="none" strike="noStrike" dirty="0">
+                        <a:solidFill>
+                          <a:srgbClr val="000000"/>
+                        </a:solidFill>
+                        <a:effectLst/>
+                        <a:latin typeface="Calibri" panose="020F0502020204030204" pitchFamily="34" charset="0"/>
+                      </a:endParaRPr>
+                    </a:p>
+                  </a:txBody>
+                  <a:tcPr marL="9525" marR="9525" marT="9525" marB="0" anchor="b">
+                    <a:lnL w="6350" cap="flat" cmpd="sng" algn="ctr">
+                      <a:solidFill>
+                        <a:srgbClr val="000000"/>
+                      </a:solidFill>
+                      <a:prstDash val="solid"/>
+                      <a:round/>
+                      <a:headEnd type="none" w="med" len="med"/>
+                      <a:tailEnd type="none" w="med" len="med"/>
+                    </a:lnL>
+                    <a:lnR>
+                      <a:noFill/>
+                    </a:lnR>
+                    <a:lnT>
+                      <a:noFill/>
+                    </a:lnT>
+                    <a:lnB>
+                      <a:noFill/>
+                    </a:lnB>
+                  </a:tcPr>
+                </a:tc>
+                <a:extLst>
+                  <a:ext uri="{0D108BD9-81ED-4DB2-BD59-A6C34878D82A}">
+                    <a16:rowId xmlns:a16="http://schemas.microsoft.com/office/drawing/2014/main" val="10000"/>
+                  </a:ext>
+                </a:extLst>
+              </a:tr>
+              <a:tr h="190500">
+                <a:tc>
+                  <a:txBody>
+                    <a:bodyPr/>
+                    <a:lstStyle/>
+                    <a:p>
+                      <a:pPr algn="l" fontAlgn="b"/>
+                      <a:r>
+                        <a:rPr lang="es-ES" sz="1200" b="0" i="0" u="none" strike="noStrike">
+                          <a:solidFill>
+                            <a:srgbClr val="000000"/>
+                          </a:solidFill>
+                          <a:effectLst/>
+                          <a:latin typeface="Calibri" panose="020F0502020204030204" pitchFamily="34" charset="0"/>
+                        </a:rPr>
+                        <a:t>Laguna Mayor</a:t>
+                      </a:r>
+                    </a:p>
+                  </a:txBody>
+                  <a:tcPr marL="9525" marR="9525" marT="9525" marB="0" anchor="b">
+                    <a:lnL w="6350" cap="flat" cmpd="sng" algn="ctr">
+                      <a:solidFill>
+                        <a:srgbClr val="000000"/>
+                      </a:solidFill>
+                      <a:prstDash val="solid"/>
+                      <a:round/>
+                      <a:headEnd type="none" w="med" len="med"/>
+                      <a:tailEnd type="none" w="med" len="med"/>
+                    </a:lnL>
+                    <a:lnR w="6350" cap="flat" cmpd="sng" algn="ctr">
+                      <a:solidFill>
+                        <a:srgbClr val="000000"/>
+                      </a:solidFill>
+                      <a:prstDash val="solid"/>
+                      <a:round/>
+                      <a:headEnd type="none" w="med" len="med"/>
+                      <a:tailEnd type="none" w="med" len="med"/>
+                    </a:lnR>
+                    <a:lnT w="6350" cap="flat" cmpd="sng" algn="ctr">
+                      <a:solidFill>
+                        <a:srgbClr val="000000"/>
+                      </a:solidFill>
+                      <a:prstDash val="solid"/>
+                      <a:round/>
+                      <a:headEnd type="none" w="med" len="med"/>
+                      <a:tailEnd type="none" w="med" len="med"/>
+                    </a:lnT>
+                    <a:lnB w="6350" cap="flat" cmpd="sng" algn="ctr">
+                      <a:solidFill>
+                        <a:srgbClr val="000000"/>
+                      </a:solidFill>
+                      <a:prstDash val="solid"/>
+                      <a:round/>
+                      <a:headEnd type="none" w="med" len="med"/>
+                      <a:tailEnd type="none" w="med" len="med"/>
+                    </a:lnB>
+                  </a:tcPr>
+                </a:tc>
+                <a:tc>
+                  <a:txBody>
+                    <a:bodyPr/>
+                    <a:lstStyle/>
+                    <a:p>
+                      <a:pPr algn="ctr" fontAlgn="ctr"/>
+                      <a:r>
+                        <a:rPr lang="es-ES" sz="1200" b="0" i="0" u="none" strike="noStrike">
+                          <a:solidFill>
+                            <a:srgbClr val="000000"/>
+                          </a:solidFill>
+                          <a:effectLst/>
+                          <a:latin typeface="Calibri" panose="020F0502020204030204" pitchFamily="34" charset="0"/>
+                        </a:rPr>
+                        <a:t>10</a:t>
+                      </a:r>
+                    </a:p>
+                  </a:txBody>
+                  <a:tcPr marL="9525" marR="9525" marT="9525" marB="0" anchor="ctr">
+                    <a:lnL w="6350" cap="flat" cmpd="sng" algn="ctr">
+                      <a:solidFill>
+                        <a:srgbClr val="000000"/>
+                      </a:solidFill>
+                      <a:prstDash val="solid"/>
+                      <a:round/>
+                      <a:headEnd type="none" w="med" len="med"/>
+                      <a:tailEnd type="none" w="med" len="med"/>
+                    </a:lnL>
+                    <a:lnR w="6350" cap="flat" cmpd="sng" algn="ctr">
+                      <a:solidFill>
+                        <a:srgbClr val="000000"/>
+                      </a:solidFill>
+                      <a:prstDash val="solid"/>
+                      <a:round/>
+                      <a:headEnd type="none" w="med" len="med"/>
+                      <a:tailEnd type="none" w="med" len="med"/>
+                    </a:lnR>
+                    <a:lnT w="6350" cap="flat" cmpd="sng" algn="ctr">
+                      <a:solidFill>
+                        <a:srgbClr val="000000"/>
+                      </a:solidFill>
+                      <a:prstDash val="solid"/>
+                      <a:round/>
+                      <a:headEnd type="none" w="med" len="med"/>
+                      <a:tailEnd type="none" w="med" len="med"/>
+                    </a:lnT>
+                    <a:lnB w="6350" cap="flat" cmpd="sng" algn="ctr">
+                      <a:solidFill>
+                        <a:srgbClr val="000000"/>
+                      </a:solidFill>
+                      <a:prstDash val="solid"/>
+                      <a:round/>
+                      <a:headEnd type="none" w="med" len="med"/>
+                      <a:tailEnd type="none" w="med" len="med"/>
+                    </a:lnB>
+                  </a:tcPr>
+                </a:tc>
+                <a:tc>
+                  <a:txBody>
+                    <a:bodyPr/>
+                    <a:lstStyle/>
+                    <a:p>
+                      <a:pPr algn="ctr" fontAlgn="ctr"/>
+                      <a:r>
+                        <a:rPr lang="es-ES" sz="1200" b="0" i="0" u="none" strike="noStrike">
+                          <a:solidFill>
+                            <a:srgbClr val="000000"/>
+                          </a:solidFill>
+                          <a:effectLst/>
+                          <a:latin typeface="Calibri" panose="020F0502020204030204" pitchFamily="34" charset="0"/>
+                        </a:rPr>
+                        <a:t>0,714</a:t>
+                      </a:r>
+                    </a:p>
+                  </a:txBody>
+                  <a:tcPr marL="9525" marR="9525" marT="9525" marB="0" anchor="ctr">
+                    <a:lnL w="6350" cap="flat" cmpd="sng" algn="ctr">
+                      <a:solidFill>
+                        <a:srgbClr val="000000"/>
+                      </a:solidFill>
+                      <a:prstDash val="solid"/>
+                      <a:round/>
+                      <a:headEnd type="none" w="med" len="med"/>
+                      <a:tailEnd type="none" w="med" len="med"/>
+                    </a:lnL>
+                    <a:lnR w="6350" cap="flat" cmpd="sng" algn="ctr">
+                      <a:solidFill>
+                        <a:srgbClr val="000000"/>
+                      </a:solidFill>
+                      <a:prstDash val="solid"/>
+                      <a:round/>
+                      <a:headEnd type="none" w="med" len="med"/>
+                      <a:tailEnd type="none" w="med" len="med"/>
+                    </a:lnR>
+                    <a:lnT w="6350" cap="flat" cmpd="sng" algn="ctr">
+                      <a:solidFill>
+                        <a:srgbClr val="000000"/>
+                      </a:solidFill>
+                      <a:prstDash val="solid"/>
+                      <a:round/>
+                      <a:headEnd type="none" w="med" len="med"/>
+                      <a:tailEnd type="none" w="med" len="med"/>
+                    </a:lnT>
+                    <a:lnB w="6350" cap="flat" cmpd="sng" algn="ctr">
+                      <a:solidFill>
+                        <a:srgbClr val="000000"/>
+                      </a:solidFill>
+                      <a:prstDash val="solid"/>
+                      <a:round/>
+                      <a:headEnd type="none" w="med" len="med"/>
+                      <a:tailEnd type="none" w="med" len="med"/>
+                    </a:lnB>
+                  </a:tcPr>
+                </a:tc>
+                <a:tc>
+                  <a:txBody>
+                    <a:bodyPr/>
+                    <a:lstStyle/>
+                    <a:p>
+                      <a:pPr algn="ctr" fontAlgn="ctr"/>
+                      <a:r>
+                        <a:rPr lang="es-ES" sz="1200" b="0" i="0" u="none" strike="noStrike">
+                          <a:solidFill>
+                            <a:srgbClr val="000000"/>
+                          </a:solidFill>
+                          <a:effectLst/>
+                          <a:latin typeface="Calibri" panose="020F0502020204030204" pitchFamily="34" charset="0"/>
+                        </a:rPr>
+                        <a:t>0,510</a:t>
+                      </a:r>
+                    </a:p>
+                  </a:txBody>
+                  <a:tcPr marL="9525" marR="9525" marT="9525" marB="0" anchor="ctr">
+                    <a:lnL w="6350" cap="flat" cmpd="sng" algn="ctr">
+                      <a:solidFill>
+                        <a:srgbClr val="000000"/>
+                      </a:solidFill>
+                      <a:prstDash val="solid"/>
+                      <a:round/>
+                      <a:headEnd type="none" w="med" len="med"/>
+                      <a:tailEnd type="none" w="med" len="med"/>
+                    </a:lnL>
+                    <a:lnR w="6350" cap="flat" cmpd="sng" algn="ctr">
+                      <a:solidFill>
+                        <a:srgbClr val="000000"/>
+                      </a:solidFill>
+                      <a:prstDash val="solid"/>
+                      <a:round/>
+                      <a:headEnd type="none" w="med" len="med"/>
+                      <a:tailEnd type="none" w="med" len="med"/>
+                    </a:lnR>
+                    <a:lnT w="6350" cap="flat" cmpd="sng" algn="ctr">
+                      <a:solidFill>
+                        <a:srgbClr val="000000"/>
+                      </a:solidFill>
+                      <a:prstDash val="solid"/>
+                      <a:round/>
+                      <a:headEnd type="none" w="med" len="med"/>
+                      <a:tailEnd type="none" w="med" len="med"/>
+                    </a:lnT>
+                    <a:lnB w="6350" cap="flat" cmpd="sng" algn="ctr">
+                      <a:solidFill>
+                        <a:srgbClr val="000000"/>
+                      </a:solidFill>
+                      <a:prstDash val="solid"/>
+                      <a:round/>
+                      <a:headEnd type="none" w="med" len="med"/>
+                      <a:tailEnd type="none" w="med" len="med"/>
+                    </a:lnB>
+                  </a:tcPr>
+                </a:tc>
+                <a:tc>
+                  <a:txBody>
+                    <a:bodyPr/>
+                    <a:lstStyle/>
+                    <a:p>
+                      <a:pPr algn="l" fontAlgn="b"/>
+                      <a:endParaRPr lang="es-ES" sz="1200" b="0" i="0" u="none" strike="noStrike">
+                        <a:solidFill>
+                          <a:srgbClr val="000000"/>
+                        </a:solidFill>
+                        <a:effectLst/>
+                        <a:latin typeface="Calibri" panose="020F0502020204030204" pitchFamily="34" charset="0"/>
+                      </a:endParaRPr>
+                    </a:p>
+                  </a:txBody>
+                  <a:tcPr marL="9525" marR="9525" marT="9525" marB="0" anchor="b">
+                    <a:lnL w="6350" cap="flat" cmpd="sng" algn="ctr">
+                      <a:solidFill>
+                        <a:srgbClr val="000000"/>
+                      </a:solidFill>
+                      <a:prstDash val="solid"/>
+                      <a:round/>
+                      <a:headEnd type="none" w="med" len="med"/>
+                      <a:tailEnd type="none" w="med" len="med"/>
+                    </a:lnL>
+                    <a:lnR>
+                      <a:noFill/>
+                    </a:lnR>
+                    <a:lnT>
+                      <a:noFill/>
+                    </a:lnT>
+                    <a:lnB>
+                      <a:noFill/>
+                    </a:lnB>
+                  </a:tcPr>
+                </a:tc>
+                <a:extLst>
+                  <a:ext uri="{0D108BD9-81ED-4DB2-BD59-A6C34878D82A}">
+                    <a16:rowId xmlns:a16="http://schemas.microsoft.com/office/drawing/2014/main" val="10001"/>
+                  </a:ext>
+                </a:extLst>
+              </a:tr>
+              <a:tr h="190500">
+                <a:tc>
+                  <a:txBody>
+                    <a:bodyPr/>
+                    <a:lstStyle/>
+                    <a:p>
+                      <a:pPr algn="l" fontAlgn="b"/>
+                      <a:r>
+                        <a:rPr lang="es-ES" sz="1200" b="0" i="0" u="none" strike="noStrike" dirty="0">
+                          <a:solidFill>
+                            <a:srgbClr val="000000"/>
+                          </a:solidFill>
+                          <a:effectLst/>
+                          <a:latin typeface="Calibri" panose="020F0502020204030204" pitchFamily="34" charset="0"/>
+                        </a:rPr>
+                        <a:t>Laguna Marvilla</a:t>
+                      </a:r>
+                    </a:p>
+                  </a:txBody>
+                  <a:tcPr marL="9525" marR="9525" marT="9525" marB="0" anchor="b">
+                    <a:lnL w="6350" cap="flat" cmpd="sng" algn="ctr">
+                      <a:solidFill>
+                        <a:srgbClr val="000000"/>
+                      </a:solidFill>
+                      <a:prstDash val="solid"/>
+                      <a:round/>
+                      <a:headEnd type="none" w="med" len="med"/>
+                      <a:tailEnd type="none" w="med" len="med"/>
+                    </a:lnL>
+                    <a:lnR w="6350" cap="flat" cmpd="sng" algn="ctr">
+                      <a:solidFill>
+                        <a:srgbClr val="000000"/>
+                      </a:solidFill>
+                      <a:prstDash val="solid"/>
+                      <a:round/>
+                      <a:headEnd type="none" w="med" len="med"/>
+                      <a:tailEnd type="none" w="med" len="med"/>
+                    </a:lnR>
+                    <a:lnT w="6350" cap="flat" cmpd="sng" algn="ctr">
+                      <a:solidFill>
+                        <a:srgbClr val="000000"/>
+                      </a:solidFill>
+                      <a:prstDash val="solid"/>
+                      <a:round/>
+                      <a:headEnd type="none" w="med" len="med"/>
+                      <a:tailEnd type="none" w="med" len="med"/>
+                    </a:lnT>
+                    <a:lnB w="6350" cap="flat" cmpd="sng" algn="ctr">
+                      <a:solidFill>
+                        <a:srgbClr val="000000"/>
+                      </a:solidFill>
+                      <a:prstDash val="solid"/>
+                      <a:round/>
+                      <a:headEnd type="none" w="med" len="med"/>
+                      <a:tailEnd type="none" w="med" len="med"/>
+                    </a:lnB>
+                  </a:tcPr>
+                </a:tc>
+                <a:tc>
+                  <a:txBody>
+                    <a:bodyPr/>
+                    <a:lstStyle/>
+                    <a:p>
+                      <a:pPr algn="ctr" fontAlgn="ctr"/>
+                      <a:r>
+                        <a:rPr lang="es-ES" sz="1200" b="0" i="0" u="none" strike="noStrike">
+                          <a:solidFill>
+                            <a:srgbClr val="000000"/>
+                          </a:solidFill>
+                          <a:effectLst/>
+                          <a:latin typeface="Calibri" panose="020F0502020204030204" pitchFamily="34" charset="0"/>
+                        </a:rPr>
+                        <a:t>4</a:t>
+                      </a:r>
+                    </a:p>
+                  </a:txBody>
+                  <a:tcPr marL="9525" marR="9525" marT="9525" marB="0" anchor="ctr">
+                    <a:lnL w="6350" cap="flat" cmpd="sng" algn="ctr">
+                      <a:solidFill>
+                        <a:srgbClr val="000000"/>
+                      </a:solidFill>
+                      <a:prstDash val="solid"/>
+                      <a:round/>
+                      <a:headEnd type="none" w="med" len="med"/>
+                      <a:tailEnd type="none" w="med" len="med"/>
+                    </a:lnL>
+                    <a:lnR w="6350" cap="flat" cmpd="sng" algn="ctr">
+                      <a:solidFill>
+                        <a:srgbClr val="000000"/>
+                      </a:solidFill>
+                      <a:prstDash val="solid"/>
+                      <a:round/>
+                      <a:headEnd type="none" w="med" len="med"/>
+                      <a:tailEnd type="none" w="med" len="med"/>
+                    </a:lnR>
+                    <a:lnT w="6350" cap="flat" cmpd="sng" algn="ctr">
+                      <a:solidFill>
+                        <a:srgbClr val="000000"/>
+                      </a:solidFill>
+                      <a:prstDash val="solid"/>
+                      <a:round/>
+                      <a:headEnd type="none" w="med" len="med"/>
+                      <a:tailEnd type="none" w="med" len="med"/>
+                    </a:lnT>
+                    <a:lnB w="6350" cap="flat" cmpd="sng" algn="ctr">
+                      <a:solidFill>
+                        <a:srgbClr val="000000"/>
+                      </a:solidFill>
+                      <a:prstDash val="solid"/>
+                      <a:round/>
+                      <a:headEnd type="none" w="med" len="med"/>
+                      <a:tailEnd type="none" w="med" len="med"/>
+                    </a:lnB>
+                  </a:tcPr>
+                </a:tc>
+                <a:tc>
+                  <a:txBody>
+                    <a:bodyPr/>
+                    <a:lstStyle/>
+                    <a:p>
+                      <a:pPr algn="ctr" fontAlgn="ctr"/>
+                      <a:r>
+                        <a:rPr lang="es-ES" sz="1200" b="0" i="0" u="none" strike="noStrike">
+                          <a:solidFill>
+                            <a:srgbClr val="000000"/>
+                          </a:solidFill>
+                          <a:effectLst/>
+                          <a:latin typeface="Calibri" panose="020F0502020204030204" pitchFamily="34" charset="0"/>
+                        </a:rPr>
+                        <a:t>0,286</a:t>
+                      </a:r>
+                    </a:p>
+                  </a:txBody>
+                  <a:tcPr marL="9525" marR="9525" marT="9525" marB="0" anchor="ctr">
+                    <a:lnL w="6350" cap="flat" cmpd="sng" algn="ctr">
+                      <a:solidFill>
+                        <a:srgbClr val="000000"/>
+                      </a:solidFill>
+                      <a:prstDash val="solid"/>
+                      <a:round/>
+                      <a:headEnd type="none" w="med" len="med"/>
+                      <a:tailEnd type="none" w="med" len="med"/>
+                    </a:lnL>
+                    <a:lnR w="6350" cap="flat" cmpd="sng" algn="ctr">
+                      <a:solidFill>
+                        <a:srgbClr val="000000"/>
+                      </a:solidFill>
+                      <a:prstDash val="solid"/>
+                      <a:round/>
+                      <a:headEnd type="none" w="med" len="med"/>
+                      <a:tailEnd type="none" w="med" len="med"/>
+                    </a:lnR>
+                    <a:lnT w="6350" cap="flat" cmpd="sng" algn="ctr">
+                      <a:solidFill>
+                        <a:srgbClr val="000000"/>
+                      </a:solidFill>
+                      <a:prstDash val="solid"/>
+                      <a:round/>
+                      <a:headEnd type="none" w="med" len="med"/>
+                      <a:tailEnd type="none" w="med" len="med"/>
+                    </a:lnT>
+                    <a:lnB w="6350" cap="flat" cmpd="sng" algn="ctr">
+                      <a:solidFill>
+                        <a:srgbClr val="000000"/>
+                      </a:solidFill>
+                      <a:prstDash val="solid"/>
+                      <a:round/>
+                      <a:headEnd type="none" w="med" len="med"/>
+                      <a:tailEnd type="none" w="med" len="med"/>
+                    </a:lnB>
+                  </a:tcPr>
+                </a:tc>
+                <a:tc>
+                  <a:txBody>
+                    <a:bodyPr/>
+                    <a:lstStyle/>
+                    <a:p>
+                      <a:pPr algn="ctr" fontAlgn="ctr"/>
+                      <a:r>
+                        <a:rPr lang="es-ES" sz="1200" b="0" i="0" u="none" strike="noStrike">
+                          <a:solidFill>
+                            <a:srgbClr val="000000"/>
+                          </a:solidFill>
+                          <a:effectLst/>
+                          <a:latin typeface="Calibri" panose="020F0502020204030204" pitchFamily="34" charset="0"/>
+                        </a:rPr>
+                        <a:t>0,082</a:t>
+                      </a:r>
+                    </a:p>
+                  </a:txBody>
+                  <a:tcPr marL="9525" marR="9525" marT="9525" marB="0" anchor="ctr">
+                    <a:lnL w="6350" cap="flat" cmpd="sng" algn="ctr">
+                      <a:solidFill>
+                        <a:srgbClr val="000000"/>
+                      </a:solidFill>
+                      <a:prstDash val="solid"/>
+                      <a:round/>
+                      <a:headEnd type="none" w="med" len="med"/>
+                      <a:tailEnd type="none" w="med" len="med"/>
+                    </a:lnL>
+                    <a:lnR w="6350" cap="flat" cmpd="sng" algn="ctr">
+                      <a:solidFill>
+                        <a:srgbClr val="000000"/>
+                      </a:solidFill>
+                      <a:prstDash val="solid"/>
+                      <a:round/>
+                      <a:headEnd type="none" w="med" len="med"/>
+                      <a:tailEnd type="none" w="med" len="med"/>
+                    </a:lnR>
+                    <a:lnT w="6350" cap="flat" cmpd="sng" algn="ctr">
+                      <a:solidFill>
+                        <a:srgbClr val="000000"/>
+                      </a:solidFill>
+                      <a:prstDash val="solid"/>
+                      <a:round/>
+                      <a:headEnd type="none" w="med" len="med"/>
+                      <a:tailEnd type="none" w="med" len="med"/>
+                    </a:lnT>
+                    <a:lnB w="6350" cap="flat" cmpd="sng" algn="ctr">
+                      <a:solidFill>
+                        <a:srgbClr val="000000"/>
+                      </a:solidFill>
+                      <a:prstDash val="solid"/>
+                      <a:round/>
+                      <a:headEnd type="none" w="med" len="med"/>
+                      <a:tailEnd type="none" w="med" len="med"/>
+                    </a:lnB>
+                  </a:tcPr>
+                </a:tc>
+                <a:tc>
+                  <a:txBody>
+                    <a:bodyPr/>
+                    <a:lstStyle/>
+                    <a:p>
+                      <a:pPr algn="l" fontAlgn="b"/>
+                      <a:endParaRPr lang="es-ES" sz="1200" b="0" i="0" u="none" strike="noStrike">
+                        <a:solidFill>
+                          <a:srgbClr val="000000"/>
+                        </a:solidFill>
+                        <a:effectLst/>
+                        <a:latin typeface="Calibri" panose="020F0502020204030204" pitchFamily="34" charset="0"/>
+                      </a:endParaRPr>
+                    </a:p>
+                  </a:txBody>
+                  <a:tcPr marL="9525" marR="9525" marT="9525" marB="0" anchor="b">
+                    <a:lnL w="6350" cap="flat" cmpd="sng" algn="ctr">
+                      <a:solidFill>
+                        <a:srgbClr val="000000"/>
+                      </a:solidFill>
+                      <a:prstDash val="solid"/>
+                      <a:round/>
+                      <a:headEnd type="none" w="med" len="med"/>
+                      <a:tailEnd type="none" w="med" len="med"/>
+                    </a:lnL>
+                    <a:lnR>
+                      <a:noFill/>
+                    </a:lnR>
+                    <a:lnT>
+                      <a:noFill/>
+                    </a:lnT>
+                    <a:lnB>
+                      <a:noFill/>
+                    </a:lnB>
+                  </a:tcPr>
+                </a:tc>
+                <a:extLst>
+                  <a:ext uri="{0D108BD9-81ED-4DB2-BD59-A6C34878D82A}">
+                    <a16:rowId xmlns:a16="http://schemas.microsoft.com/office/drawing/2014/main" val="10002"/>
+                  </a:ext>
+                </a:extLst>
+              </a:tr>
+              <a:tr h="190500">
+                <a:tc>
+                  <a:txBody>
+                    <a:bodyPr/>
+                    <a:lstStyle/>
+                    <a:p>
+                      <a:pPr algn="l" fontAlgn="b"/>
+                      <a:r>
+                        <a:rPr lang="es-ES" sz="1200" b="0" i="0" u="none" strike="noStrike">
+                          <a:solidFill>
+                            <a:srgbClr val="000000"/>
+                          </a:solidFill>
+                          <a:effectLst/>
+                          <a:latin typeface="Calibri" panose="020F0502020204030204" pitchFamily="34" charset="0"/>
+                        </a:rPr>
+                        <a:t>JuncaI</a:t>
+                      </a:r>
+                    </a:p>
+                  </a:txBody>
+                  <a:tcPr marL="9525" marR="9525" marT="9525" marB="0" anchor="b">
+                    <a:lnL w="6350" cap="flat" cmpd="sng" algn="ctr">
+                      <a:solidFill>
+                        <a:srgbClr val="000000"/>
+                      </a:solidFill>
+                      <a:prstDash val="solid"/>
+                      <a:round/>
+                      <a:headEnd type="none" w="med" len="med"/>
+                      <a:tailEnd type="none" w="med" len="med"/>
+                    </a:lnL>
+                    <a:lnR w="6350" cap="flat" cmpd="sng" algn="ctr">
+                      <a:solidFill>
+                        <a:srgbClr val="000000"/>
+                      </a:solidFill>
+                      <a:prstDash val="solid"/>
+                      <a:round/>
+                      <a:headEnd type="none" w="med" len="med"/>
+                      <a:tailEnd type="none" w="med" len="med"/>
+                    </a:lnR>
+                    <a:lnT w="6350" cap="flat" cmpd="sng" algn="ctr">
+                      <a:solidFill>
+                        <a:srgbClr val="000000"/>
+                      </a:solidFill>
+                      <a:prstDash val="solid"/>
+                      <a:round/>
+                      <a:headEnd type="none" w="med" len="med"/>
+                      <a:tailEnd type="none" w="med" len="med"/>
+                    </a:lnT>
+                    <a:lnB w="6350" cap="flat" cmpd="sng" algn="ctr">
+                      <a:solidFill>
+                        <a:srgbClr val="000000"/>
+                      </a:solidFill>
+                      <a:prstDash val="solid"/>
+                      <a:round/>
+                      <a:headEnd type="none" w="med" len="med"/>
+                      <a:tailEnd type="none" w="med" len="med"/>
+                    </a:lnB>
+                  </a:tcPr>
+                </a:tc>
+                <a:tc>
+                  <a:txBody>
+                    <a:bodyPr/>
+                    <a:lstStyle/>
+                    <a:p>
+                      <a:pPr algn="ctr" fontAlgn="ctr"/>
+                      <a:r>
+                        <a:rPr lang="es-ES" sz="1200" b="0" i="0" u="none" strike="noStrike">
+                          <a:solidFill>
+                            <a:srgbClr val="000000"/>
+                          </a:solidFill>
+                          <a:effectLst/>
+                          <a:latin typeface="Calibri" panose="020F0502020204030204" pitchFamily="34" charset="0"/>
+                        </a:rPr>
+                        <a:t>0</a:t>
+                      </a:r>
+                    </a:p>
+                  </a:txBody>
+                  <a:tcPr marL="9525" marR="9525" marT="9525" marB="0" anchor="ctr">
+                    <a:lnL w="6350" cap="flat" cmpd="sng" algn="ctr">
+                      <a:solidFill>
+                        <a:srgbClr val="000000"/>
+                      </a:solidFill>
+                      <a:prstDash val="solid"/>
+                      <a:round/>
+                      <a:headEnd type="none" w="med" len="med"/>
+                      <a:tailEnd type="none" w="med" len="med"/>
+                    </a:lnL>
+                    <a:lnR w="6350" cap="flat" cmpd="sng" algn="ctr">
+                      <a:solidFill>
+                        <a:srgbClr val="000000"/>
+                      </a:solidFill>
+                      <a:prstDash val="solid"/>
+                      <a:round/>
+                      <a:headEnd type="none" w="med" len="med"/>
+                      <a:tailEnd type="none" w="med" len="med"/>
+                    </a:lnR>
+                    <a:lnT w="6350" cap="flat" cmpd="sng" algn="ctr">
+                      <a:solidFill>
+                        <a:srgbClr val="000000"/>
+                      </a:solidFill>
+                      <a:prstDash val="solid"/>
+                      <a:round/>
+                      <a:headEnd type="none" w="med" len="med"/>
+                      <a:tailEnd type="none" w="med" len="med"/>
+                    </a:lnT>
+                    <a:lnB w="6350" cap="flat" cmpd="sng" algn="ctr">
+                      <a:solidFill>
+                        <a:srgbClr val="000000"/>
+                      </a:solidFill>
+                      <a:prstDash val="solid"/>
+                      <a:round/>
+                      <a:headEnd type="none" w="med" len="med"/>
+                      <a:tailEnd type="none" w="med" len="med"/>
+                    </a:lnB>
+                  </a:tcPr>
+                </a:tc>
+                <a:tc>
+                  <a:txBody>
+                    <a:bodyPr/>
+                    <a:lstStyle/>
+                    <a:p>
+                      <a:pPr algn="ctr" fontAlgn="ctr"/>
+                      <a:r>
+                        <a:rPr lang="es-ES" sz="1200" b="0" i="0" u="none" strike="noStrike">
+                          <a:solidFill>
+                            <a:srgbClr val="000000"/>
+                          </a:solidFill>
+                          <a:effectLst/>
+                          <a:latin typeface="Calibri" panose="020F0502020204030204" pitchFamily="34" charset="0"/>
+                        </a:rPr>
+                        <a:t>0,000</a:t>
+                      </a:r>
+                    </a:p>
+                  </a:txBody>
+                  <a:tcPr marL="9525" marR="9525" marT="9525" marB="0" anchor="ctr">
+                    <a:lnL w="6350" cap="flat" cmpd="sng" algn="ctr">
+                      <a:solidFill>
+                        <a:srgbClr val="000000"/>
+                      </a:solidFill>
+                      <a:prstDash val="solid"/>
+                      <a:round/>
+                      <a:headEnd type="none" w="med" len="med"/>
+                      <a:tailEnd type="none" w="med" len="med"/>
+                    </a:lnL>
+                    <a:lnR w="6350" cap="flat" cmpd="sng" algn="ctr">
+                      <a:solidFill>
+                        <a:srgbClr val="000000"/>
+                      </a:solidFill>
+                      <a:prstDash val="solid"/>
+                      <a:round/>
+                      <a:headEnd type="none" w="med" len="med"/>
+                      <a:tailEnd type="none" w="med" len="med"/>
+                    </a:lnR>
+                    <a:lnT w="6350" cap="flat" cmpd="sng" algn="ctr">
+                      <a:solidFill>
+                        <a:srgbClr val="000000"/>
+                      </a:solidFill>
+                      <a:prstDash val="solid"/>
+                      <a:round/>
+                      <a:headEnd type="none" w="med" len="med"/>
+                      <a:tailEnd type="none" w="med" len="med"/>
+                    </a:lnT>
+                    <a:lnB w="6350" cap="flat" cmpd="sng" algn="ctr">
+                      <a:solidFill>
+                        <a:srgbClr val="000000"/>
+                      </a:solidFill>
+                      <a:prstDash val="solid"/>
+                      <a:round/>
+                      <a:headEnd type="none" w="med" len="med"/>
+                      <a:tailEnd type="none" w="med" len="med"/>
+                    </a:lnB>
+                  </a:tcPr>
+                </a:tc>
+                <a:tc>
+                  <a:txBody>
+                    <a:bodyPr/>
+                    <a:lstStyle/>
+                    <a:p>
+                      <a:pPr algn="ctr" fontAlgn="ctr"/>
+                      <a:r>
+                        <a:rPr lang="es-ES" sz="1200" b="0" i="0" u="none" strike="noStrike">
+                          <a:solidFill>
+                            <a:srgbClr val="000000"/>
+                          </a:solidFill>
+                          <a:effectLst/>
+                          <a:latin typeface="Calibri" panose="020F0502020204030204" pitchFamily="34" charset="0"/>
+                        </a:rPr>
+                        <a:t>0,000</a:t>
+                      </a:r>
+                    </a:p>
+                  </a:txBody>
+                  <a:tcPr marL="9525" marR="9525" marT="9525" marB="0" anchor="ctr">
+                    <a:lnL w="6350" cap="flat" cmpd="sng" algn="ctr">
+                      <a:solidFill>
+                        <a:srgbClr val="000000"/>
+                      </a:solidFill>
+                      <a:prstDash val="solid"/>
+                      <a:round/>
+                      <a:headEnd type="none" w="med" len="med"/>
+                      <a:tailEnd type="none" w="med" len="med"/>
+                    </a:lnL>
+                    <a:lnR w="6350" cap="flat" cmpd="sng" algn="ctr">
+                      <a:solidFill>
+                        <a:srgbClr val="000000"/>
+                      </a:solidFill>
+                      <a:prstDash val="solid"/>
+                      <a:round/>
+                      <a:headEnd type="none" w="med" len="med"/>
+                      <a:tailEnd type="none" w="med" len="med"/>
+                    </a:lnR>
+                    <a:lnT w="6350" cap="flat" cmpd="sng" algn="ctr">
+                      <a:solidFill>
+                        <a:srgbClr val="000000"/>
+                      </a:solidFill>
+                      <a:prstDash val="solid"/>
+                      <a:round/>
+                      <a:headEnd type="none" w="med" len="med"/>
+                      <a:tailEnd type="none" w="med" len="med"/>
+                    </a:lnT>
+                    <a:lnB w="6350" cap="flat" cmpd="sng" algn="ctr">
+                      <a:solidFill>
+                        <a:srgbClr val="000000"/>
+                      </a:solidFill>
+                      <a:prstDash val="solid"/>
+                      <a:round/>
+                      <a:headEnd type="none" w="med" len="med"/>
+                      <a:tailEnd type="none" w="med" len="med"/>
+                    </a:lnB>
+                  </a:tcPr>
+                </a:tc>
+                <a:tc>
+                  <a:txBody>
+                    <a:bodyPr/>
+                    <a:lstStyle/>
+                    <a:p>
+                      <a:pPr algn="l" fontAlgn="b"/>
+                      <a:endParaRPr lang="es-ES" sz="1200" b="0" i="0" u="none" strike="noStrike">
+                        <a:solidFill>
+                          <a:srgbClr val="000000"/>
+                        </a:solidFill>
+                        <a:effectLst/>
+                        <a:latin typeface="Calibri" panose="020F0502020204030204" pitchFamily="34" charset="0"/>
+                      </a:endParaRPr>
+                    </a:p>
+                  </a:txBody>
+                  <a:tcPr marL="9525" marR="9525" marT="9525" marB="0" anchor="b">
+                    <a:lnL w="6350" cap="flat" cmpd="sng" algn="ctr">
+                      <a:solidFill>
+                        <a:srgbClr val="000000"/>
+                      </a:solidFill>
+                      <a:prstDash val="solid"/>
+                      <a:round/>
+                      <a:headEnd type="none" w="med" len="med"/>
+                      <a:tailEnd type="none" w="med" len="med"/>
+                    </a:lnL>
+                    <a:lnR>
+                      <a:noFill/>
+                    </a:lnR>
+                    <a:lnT>
+                      <a:noFill/>
+                    </a:lnT>
+                    <a:lnB>
+                      <a:noFill/>
+                    </a:lnB>
+                  </a:tcPr>
+                </a:tc>
+                <a:extLst>
+                  <a:ext uri="{0D108BD9-81ED-4DB2-BD59-A6C34878D82A}">
+                    <a16:rowId xmlns:a16="http://schemas.microsoft.com/office/drawing/2014/main" val="10003"/>
+                  </a:ext>
+                </a:extLst>
+              </a:tr>
+              <a:tr h="190500">
+                <a:tc>
+                  <a:txBody>
+                    <a:bodyPr/>
+                    <a:lstStyle/>
+                    <a:p>
+                      <a:pPr algn="l" fontAlgn="b"/>
+                      <a:r>
+                        <a:rPr lang="es-ES" sz="1200" b="0" i="0" u="none" strike="noStrike">
+                          <a:solidFill>
+                            <a:srgbClr val="000000"/>
+                          </a:solidFill>
+                          <a:effectLst/>
+                          <a:latin typeface="Calibri" panose="020F0502020204030204" pitchFamily="34" charset="0"/>
+                        </a:rPr>
+                        <a:t>Gramadal y ArenaI</a:t>
+                      </a:r>
+                    </a:p>
+                  </a:txBody>
+                  <a:tcPr marL="9525" marR="9525" marT="9525" marB="0" anchor="b">
+                    <a:lnL w="6350" cap="flat" cmpd="sng" algn="ctr">
+                      <a:solidFill>
+                        <a:srgbClr val="000000"/>
+                      </a:solidFill>
+                      <a:prstDash val="solid"/>
+                      <a:round/>
+                      <a:headEnd type="none" w="med" len="med"/>
+                      <a:tailEnd type="none" w="med" len="med"/>
+                    </a:lnL>
+                    <a:lnR w="6350" cap="flat" cmpd="sng" algn="ctr">
+                      <a:solidFill>
+                        <a:srgbClr val="000000"/>
+                      </a:solidFill>
+                      <a:prstDash val="solid"/>
+                      <a:round/>
+                      <a:headEnd type="none" w="med" len="med"/>
+                      <a:tailEnd type="none" w="med" len="med"/>
+                    </a:lnR>
+                    <a:lnT w="6350" cap="flat" cmpd="sng" algn="ctr">
+                      <a:solidFill>
+                        <a:srgbClr val="000000"/>
+                      </a:solidFill>
+                      <a:prstDash val="solid"/>
+                      <a:round/>
+                      <a:headEnd type="none" w="med" len="med"/>
+                      <a:tailEnd type="none" w="med" len="med"/>
+                    </a:lnT>
+                    <a:lnB w="6350" cap="flat" cmpd="sng" algn="ctr">
+                      <a:solidFill>
+                        <a:srgbClr val="000000"/>
+                      </a:solidFill>
+                      <a:prstDash val="solid"/>
+                      <a:round/>
+                      <a:headEnd type="none" w="med" len="med"/>
+                      <a:tailEnd type="none" w="med" len="med"/>
+                    </a:lnB>
+                  </a:tcPr>
+                </a:tc>
+                <a:tc>
+                  <a:txBody>
+                    <a:bodyPr/>
+                    <a:lstStyle/>
+                    <a:p>
+                      <a:pPr algn="ctr" fontAlgn="ctr"/>
+                      <a:r>
+                        <a:rPr lang="es-ES" sz="1200" b="0" i="0" u="none" strike="noStrike">
+                          <a:solidFill>
+                            <a:srgbClr val="000000"/>
+                          </a:solidFill>
+                          <a:effectLst/>
+                          <a:latin typeface="Calibri" panose="020F0502020204030204" pitchFamily="34" charset="0"/>
+                        </a:rPr>
+                        <a:t>0</a:t>
+                      </a:r>
+                    </a:p>
+                  </a:txBody>
+                  <a:tcPr marL="9525" marR="9525" marT="9525" marB="0" anchor="ctr">
+                    <a:lnL w="6350" cap="flat" cmpd="sng" algn="ctr">
+                      <a:solidFill>
+                        <a:srgbClr val="000000"/>
+                      </a:solidFill>
+                      <a:prstDash val="solid"/>
+                      <a:round/>
+                      <a:headEnd type="none" w="med" len="med"/>
+                      <a:tailEnd type="none" w="med" len="med"/>
+                    </a:lnL>
+                    <a:lnR w="6350" cap="flat" cmpd="sng" algn="ctr">
+                      <a:solidFill>
+                        <a:srgbClr val="000000"/>
+                      </a:solidFill>
+                      <a:prstDash val="solid"/>
+                      <a:round/>
+                      <a:headEnd type="none" w="med" len="med"/>
+                      <a:tailEnd type="none" w="med" len="med"/>
+                    </a:lnR>
+                    <a:lnT w="6350" cap="flat" cmpd="sng" algn="ctr">
+                      <a:solidFill>
+                        <a:srgbClr val="000000"/>
+                      </a:solidFill>
+                      <a:prstDash val="solid"/>
+                      <a:round/>
+                      <a:headEnd type="none" w="med" len="med"/>
+                      <a:tailEnd type="none" w="med" len="med"/>
+                    </a:lnT>
+                    <a:lnB w="6350" cap="flat" cmpd="sng" algn="ctr">
+                      <a:solidFill>
+                        <a:srgbClr val="000000"/>
+                      </a:solidFill>
+                      <a:prstDash val="solid"/>
+                      <a:round/>
+                      <a:headEnd type="none" w="med" len="med"/>
+                      <a:tailEnd type="none" w="med" len="med"/>
+                    </a:lnB>
+                  </a:tcPr>
+                </a:tc>
+                <a:tc>
+                  <a:txBody>
+                    <a:bodyPr/>
+                    <a:lstStyle/>
+                    <a:p>
+                      <a:pPr algn="ctr" fontAlgn="ctr"/>
+                      <a:r>
+                        <a:rPr lang="es-ES" sz="1200" b="0" i="0" u="none" strike="noStrike">
+                          <a:solidFill>
+                            <a:srgbClr val="000000"/>
+                          </a:solidFill>
+                          <a:effectLst/>
+                          <a:latin typeface="Calibri" panose="020F0502020204030204" pitchFamily="34" charset="0"/>
+                        </a:rPr>
+                        <a:t>0,000</a:t>
+                      </a:r>
+                    </a:p>
+                  </a:txBody>
+                  <a:tcPr marL="9525" marR="9525" marT="9525" marB="0" anchor="ctr">
+                    <a:lnL w="6350" cap="flat" cmpd="sng" algn="ctr">
+                      <a:solidFill>
+                        <a:srgbClr val="000000"/>
+                      </a:solidFill>
+                      <a:prstDash val="solid"/>
+                      <a:round/>
+                      <a:headEnd type="none" w="med" len="med"/>
+                      <a:tailEnd type="none" w="med" len="med"/>
+                    </a:lnL>
+                    <a:lnR w="6350" cap="flat" cmpd="sng" algn="ctr">
+                      <a:solidFill>
+                        <a:srgbClr val="000000"/>
+                      </a:solidFill>
+                      <a:prstDash val="solid"/>
+                      <a:round/>
+                      <a:headEnd type="none" w="med" len="med"/>
+                      <a:tailEnd type="none" w="med" len="med"/>
+                    </a:lnR>
+                    <a:lnT w="6350" cap="flat" cmpd="sng" algn="ctr">
+                      <a:solidFill>
+                        <a:srgbClr val="000000"/>
+                      </a:solidFill>
+                      <a:prstDash val="solid"/>
+                      <a:round/>
+                      <a:headEnd type="none" w="med" len="med"/>
+                      <a:tailEnd type="none" w="med" len="med"/>
+                    </a:lnT>
+                    <a:lnB w="6350" cap="flat" cmpd="sng" algn="ctr">
+                      <a:solidFill>
+                        <a:srgbClr val="000000"/>
+                      </a:solidFill>
+                      <a:prstDash val="solid"/>
+                      <a:round/>
+                      <a:headEnd type="none" w="med" len="med"/>
+                      <a:tailEnd type="none" w="med" len="med"/>
+                    </a:lnB>
+                  </a:tcPr>
+                </a:tc>
+                <a:tc>
+                  <a:txBody>
+                    <a:bodyPr/>
+                    <a:lstStyle/>
+                    <a:p>
+                      <a:pPr algn="ctr" fontAlgn="ctr"/>
+                      <a:r>
+                        <a:rPr lang="es-ES" sz="1200" b="0" i="0" u="none" strike="noStrike">
+                          <a:solidFill>
+                            <a:srgbClr val="000000"/>
+                          </a:solidFill>
+                          <a:effectLst/>
+                          <a:latin typeface="Calibri" panose="020F0502020204030204" pitchFamily="34" charset="0"/>
+                        </a:rPr>
+                        <a:t>0,000</a:t>
+                      </a:r>
+                    </a:p>
+                  </a:txBody>
+                  <a:tcPr marL="9525" marR="9525" marT="9525" marB="0" anchor="ctr">
+                    <a:lnL w="6350" cap="flat" cmpd="sng" algn="ctr">
+                      <a:solidFill>
+                        <a:srgbClr val="000000"/>
+                      </a:solidFill>
+                      <a:prstDash val="solid"/>
+                      <a:round/>
+                      <a:headEnd type="none" w="med" len="med"/>
+                      <a:tailEnd type="none" w="med" len="med"/>
+                    </a:lnL>
+                    <a:lnR w="6350" cap="flat" cmpd="sng" algn="ctr">
+                      <a:solidFill>
+                        <a:srgbClr val="000000"/>
+                      </a:solidFill>
+                      <a:prstDash val="solid"/>
+                      <a:round/>
+                      <a:headEnd type="none" w="med" len="med"/>
+                      <a:tailEnd type="none" w="med" len="med"/>
+                    </a:lnR>
+                    <a:lnT w="6350" cap="flat" cmpd="sng" algn="ctr">
+                      <a:solidFill>
+                        <a:srgbClr val="000000"/>
+                      </a:solidFill>
+                      <a:prstDash val="solid"/>
+                      <a:round/>
+                      <a:headEnd type="none" w="med" len="med"/>
+                      <a:tailEnd type="none" w="med" len="med"/>
+                    </a:lnT>
+                    <a:lnB w="6350" cap="flat" cmpd="sng" algn="ctr">
+                      <a:solidFill>
+                        <a:srgbClr val="000000"/>
+                      </a:solidFill>
+                      <a:prstDash val="solid"/>
+                      <a:round/>
+                      <a:headEnd type="none" w="med" len="med"/>
+                      <a:tailEnd type="none" w="med" len="med"/>
+                    </a:lnB>
+                  </a:tcPr>
+                </a:tc>
+                <a:tc>
+                  <a:txBody>
+                    <a:bodyPr/>
+                    <a:lstStyle/>
+                    <a:p>
+                      <a:pPr algn="l" fontAlgn="b"/>
+                      <a:endParaRPr lang="es-ES" sz="1200" b="0" i="0" u="none" strike="noStrike">
+                        <a:solidFill>
+                          <a:srgbClr val="000000"/>
+                        </a:solidFill>
+                        <a:effectLst/>
+                        <a:latin typeface="Calibri" panose="020F0502020204030204" pitchFamily="34" charset="0"/>
+                      </a:endParaRPr>
+                    </a:p>
+                  </a:txBody>
+                  <a:tcPr marL="9525" marR="9525" marT="9525" marB="0" anchor="b">
+                    <a:lnL w="6350" cap="flat" cmpd="sng" algn="ctr">
+                      <a:solidFill>
+                        <a:srgbClr val="000000"/>
+                      </a:solidFill>
+                      <a:prstDash val="solid"/>
+                      <a:round/>
+                      <a:headEnd type="none" w="med" len="med"/>
+                      <a:tailEnd type="none" w="med" len="med"/>
+                    </a:lnL>
+                    <a:lnR>
+                      <a:noFill/>
+                    </a:lnR>
+                    <a:lnT>
+                      <a:noFill/>
+                    </a:lnT>
+                    <a:lnB>
+                      <a:noFill/>
+                    </a:lnB>
+                  </a:tcPr>
+                </a:tc>
+                <a:extLst>
+                  <a:ext uri="{0D108BD9-81ED-4DB2-BD59-A6C34878D82A}">
+                    <a16:rowId xmlns:a16="http://schemas.microsoft.com/office/drawing/2014/main" val="10004"/>
+                  </a:ext>
+                </a:extLst>
+              </a:tr>
+              <a:tr h="190500">
+                <a:tc>
+                  <a:txBody>
+                    <a:bodyPr/>
+                    <a:lstStyle/>
+                    <a:p>
+                      <a:pPr algn="l" fontAlgn="b"/>
+                      <a:r>
+                        <a:rPr lang="es-ES" sz="1200" b="0" i="0" u="none" strike="noStrike">
+                          <a:solidFill>
+                            <a:srgbClr val="000000"/>
+                          </a:solidFill>
+                          <a:effectLst/>
+                          <a:latin typeface="Calibri" panose="020F0502020204030204" pitchFamily="34" charset="0"/>
+                        </a:rPr>
+                        <a:t>Arbustal</a:t>
+                      </a:r>
+                    </a:p>
+                  </a:txBody>
+                  <a:tcPr marL="9525" marR="9525" marT="9525" marB="0" anchor="b">
+                    <a:lnL w="6350" cap="flat" cmpd="sng" algn="ctr">
+                      <a:solidFill>
+                        <a:srgbClr val="000000"/>
+                      </a:solidFill>
+                      <a:prstDash val="solid"/>
+                      <a:round/>
+                      <a:headEnd type="none" w="med" len="med"/>
+                      <a:tailEnd type="none" w="med" len="med"/>
+                    </a:lnL>
+                    <a:lnR w="6350" cap="flat" cmpd="sng" algn="ctr">
+                      <a:solidFill>
+                        <a:srgbClr val="000000"/>
+                      </a:solidFill>
+                      <a:prstDash val="solid"/>
+                      <a:round/>
+                      <a:headEnd type="none" w="med" len="med"/>
+                      <a:tailEnd type="none" w="med" len="med"/>
+                    </a:lnR>
+                    <a:lnT w="6350" cap="flat" cmpd="sng" algn="ctr">
+                      <a:solidFill>
+                        <a:srgbClr val="000000"/>
+                      </a:solidFill>
+                      <a:prstDash val="solid"/>
+                      <a:round/>
+                      <a:headEnd type="none" w="med" len="med"/>
+                      <a:tailEnd type="none" w="med" len="med"/>
+                    </a:lnT>
+                    <a:lnB w="6350" cap="flat" cmpd="sng" algn="ctr">
+                      <a:solidFill>
+                        <a:srgbClr val="000000"/>
+                      </a:solidFill>
+                      <a:prstDash val="solid"/>
+                      <a:round/>
+                      <a:headEnd type="none" w="med" len="med"/>
+                      <a:tailEnd type="none" w="med" len="med"/>
+                    </a:lnB>
+                  </a:tcPr>
+                </a:tc>
+                <a:tc>
+                  <a:txBody>
+                    <a:bodyPr/>
+                    <a:lstStyle/>
+                    <a:p>
+                      <a:pPr algn="ctr" fontAlgn="ctr"/>
+                      <a:r>
+                        <a:rPr lang="es-ES" sz="1200" b="0" i="0" u="none" strike="noStrike">
+                          <a:solidFill>
+                            <a:srgbClr val="000000"/>
+                          </a:solidFill>
+                          <a:effectLst/>
+                          <a:latin typeface="Calibri" panose="020F0502020204030204" pitchFamily="34" charset="0"/>
+                        </a:rPr>
+                        <a:t>0</a:t>
+                      </a:r>
+                    </a:p>
+                  </a:txBody>
+                  <a:tcPr marL="9525" marR="9525" marT="9525" marB="0" anchor="ctr">
+                    <a:lnL w="6350" cap="flat" cmpd="sng" algn="ctr">
+                      <a:solidFill>
+                        <a:srgbClr val="000000"/>
+                      </a:solidFill>
+                      <a:prstDash val="solid"/>
+                      <a:round/>
+                      <a:headEnd type="none" w="med" len="med"/>
+                      <a:tailEnd type="none" w="med" len="med"/>
+                    </a:lnL>
+                    <a:lnR w="6350" cap="flat" cmpd="sng" algn="ctr">
+                      <a:solidFill>
+                        <a:srgbClr val="000000"/>
+                      </a:solidFill>
+                      <a:prstDash val="solid"/>
+                      <a:round/>
+                      <a:headEnd type="none" w="med" len="med"/>
+                      <a:tailEnd type="none" w="med" len="med"/>
+                    </a:lnR>
+                    <a:lnT w="6350" cap="flat" cmpd="sng" algn="ctr">
+                      <a:solidFill>
+                        <a:srgbClr val="000000"/>
+                      </a:solidFill>
+                      <a:prstDash val="solid"/>
+                      <a:round/>
+                      <a:headEnd type="none" w="med" len="med"/>
+                      <a:tailEnd type="none" w="med" len="med"/>
+                    </a:lnT>
+                    <a:lnB w="6350" cap="flat" cmpd="sng" algn="ctr">
+                      <a:solidFill>
+                        <a:srgbClr val="000000"/>
+                      </a:solidFill>
+                      <a:prstDash val="solid"/>
+                      <a:round/>
+                      <a:headEnd type="none" w="med" len="med"/>
+                      <a:tailEnd type="none" w="med" len="med"/>
+                    </a:lnB>
+                  </a:tcPr>
+                </a:tc>
+                <a:tc>
+                  <a:txBody>
+                    <a:bodyPr/>
+                    <a:lstStyle/>
+                    <a:p>
+                      <a:pPr algn="ctr" fontAlgn="ctr"/>
+                      <a:r>
+                        <a:rPr lang="es-ES" sz="1200" b="0" i="0" u="none" strike="noStrike">
+                          <a:solidFill>
+                            <a:srgbClr val="000000"/>
+                          </a:solidFill>
+                          <a:effectLst/>
+                          <a:latin typeface="Calibri" panose="020F0502020204030204" pitchFamily="34" charset="0"/>
+                        </a:rPr>
+                        <a:t>0,000</a:t>
+                      </a:r>
+                    </a:p>
+                  </a:txBody>
+                  <a:tcPr marL="9525" marR="9525" marT="9525" marB="0" anchor="ctr">
+                    <a:lnL w="6350" cap="flat" cmpd="sng" algn="ctr">
+                      <a:solidFill>
+                        <a:srgbClr val="000000"/>
+                      </a:solidFill>
+                      <a:prstDash val="solid"/>
+                      <a:round/>
+                      <a:headEnd type="none" w="med" len="med"/>
+                      <a:tailEnd type="none" w="med" len="med"/>
+                    </a:lnL>
+                    <a:lnR w="6350" cap="flat" cmpd="sng" algn="ctr">
+                      <a:solidFill>
+                        <a:srgbClr val="000000"/>
+                      </a:solidFill>
+                      <a:prstDash val="solid"/>
+                      <a:round/>
+                      <a:headEnd type="none" w="med" len="med"/>
+                      <a:tailEnd type="none" w="med" len="med"/>
+                    </a:lnR>
+                    <a:lnT w="6350" cap="flat" cmpd="sng" algn="ctr">
+                      <a:solidFill>
+                        <a:srgbClr val="000000"/>
+                      </a:solidFill>
+                      <a:prstDash val="solid"/>
+                      <a:round/>
+                      <a:headEnd type="none" w="med" len="med"/>
+                      <a:tailEnd type="none" w="med" len="med"/>
+                    </a:lnT>
+                    <a:lnB w="6350" cap="flat" cmpd="sng" algn="ctr">
+                      <a:solidFill>
+                        <a:srgbClr val="000000"/>
+                      </a:solidFill>
+                      <a:prstDash val="solid"/>
+                      <a:round/>
+                      <a:headEnd type="none" w="med" len="med"/>
+                      <a:tailEnd type="none" w="med" len="med"/>
+                    </a:lnB>
+                  </a:tcPr>
+                </a:tc>
+                <a:tc>
+                  <a:txBody>
+                    <a:bodyPr/>
+                    <a:lstStyle/>
+                    <a:p>
+                      <a:pPr algn="ctr" fontAlgn="ctr"/>
+                      <a:r>
+                        <a:rPr lang="es-ES" sz="1200" b="0" i="0" u="none" strike="noStrike">
+                          <a:solidFill>
+                            <a:srgbClr val="000000"/>
+                          </a:solidFill>
+                          <a:effectLst/>
+                          <a:latin typeface="Calibri" panose="020F0502020204030204" pitchFamily="34" charset="0"/>
+                        </a:rPr>
+                        <a:t>0,000</a:t>
+                      </a:r>
+                    </a:p>
+                  </a:txBody>
+                  <a:tcPr marL="9525" marR="9525" marT="9525" marB="0" anchor="ctr">
+                    <a:lnL w="6350" cap="flat" cmpd="sng" algn="ctr">
+                      <a:solidFill>
+                        <a:srgbClr val="000000"/>
+                      </a:solidFill>
+                      <a:prstDash val="solid"/>
+                      <a:round/>
+                      <a:headEnd type="none" w="med" len="med"/>
+                      <a:tailEnd type="none" w="med" len="med"/>
+                    </a:lnL>
+                    <a:lnR w="6350" cap="flat" cmpd="sng" algn="ctr">
+                      <a:solidFill>
+                        <a:srgbClr val="000000"/>
+                      </a:solidFill>
+                      <a:prstDash val="solid"/>
+                      <a:round/>
+                      <a:headEnd type="none" w="med" len="med"/>
+                      <a:tailEnd type="none" w="med" len="med"/>
+                    </a:lnR>
+                    <a:lnT w="6350" cap="flat" cmpd="sng" algn="ctr">
+                      <a:solidFill>
+                        <a:srgbClr val="000000"/>
+                      </a:solidFill>
+                      <a:prstDash val="solid"/>
+                      <a:round/>
+                      <a:headEnd type="none" w="med" len="med"/>
+                      <a:tailEnd type="none" w="med" len="med"/>
+                    </a:lnT>
+                    <a:lnB w="6350" cap="flat" cmpd="sng" algn="ctr">
+                      <a:solidFill>
+                        <a:srgbClr val="000000"/>
+                      </a:solidFill>
+                      <a:prstDash val="solid"/>
+                      <a:round/>
+                      <a:headEnd type="none" w="med" len="med"/>
+                      <a:tailEnd type="none" w="med" len="med"/>
+                    </a:lnB>
+                  </a:tcPr>
+                </a:tc>
+                <a:tc>
+                  <a:txBody>
+                    <a:bodyPr/>
+                    <a:lstStyle/>
+                    <a:p>
+                      <a:pPr algn="l" fontAlgn="b"/>
+                      <a:endParaRPr lang="es-ES" sz="1200" b="0" i="0" u="none" strike="noStrike">
+                        <a:solidFill>
+                          <a:srgbClr val="000000"/>
+                        </a:solidFill>
+                        <a:effectLst/>
+                        <a:latin typeface="Calibri" panose="020F0502020204030204" pitchFamily="34" charset="0"/>
+                      </a:endParaRPr>
+                    </a:p>
+                  </a:txBody>
+                  <a:tcPr marL="9525" marR="9525" marT="9525" marB="0" anchor="b">
+                    <a:lnL w="6350" cap="flat" cmpd="sng" algn="ctr">
+                      <a:solidFill>
+                        <a:srgbClr val="000000"/>
+                      </a:solidFill>
+                      <a:prstDash val="solid"/>
+                      <a:round/>
+                      <a:headEnd type="none" w="med" len="med"/>
+                      <a:tailEnd type="none" w="med" len="med"/>
+                    </a:lnL>
+                    <a:lnR>
+                      <a:noFill/>
+                    </a:lnR>
+                    <a:lnT>
+                      <a:noFill/>
+                    </a:lnT>
+                    <a:lnB>
+                      <a:noFill/>
+                    </a:lnB>
+                  </a:tcPr>
+                </a:tc>
+                <a:extLst>
+                  <a:ext uri="{0D108BD9-81ED-4DB2-BD59-A6C34878D82A}">
+                    <a16:rowId xmlns:a16="http://schemas.microsoft.com/office/drawing/2014/main" val="10005"/>
+                  </a:ext>
+                </a:extLst>
+              </a:tr>
+              <a:tr h="190500">
+                <a:tc>
+                  <a:txBody>
+                    <a:bodyPr/>
+                    <a:lstStyle/>
+                    <a:p>
+                      <a:pPr algn="ctr" fontAlgn="ctr"/>
+                      <a:r>
+                        <a:rPr lang="es-ES" sz="1200" b="1" i="0" u="none" strike="noStrike">
+                          <a:solidFill>
+                            <a:srgbClr val="000000"/>
+                          </a:solidFill>
+                          <a:effectLst/>
+                          <a:latin typeface="Calibri" panose="020F0502020204030204" pitchFamily="34" charset="0"/>
+                        </a:rPr>
+                        <a:t>Total (N)</a:t>
+                      </a:r>
+                    </a:p>
+                  </a:txBody>
+                  <a:tcPr marL="9525" marR="9525" marT="9525" marB="0" anchor="ctr">
+                    <a:lnL w="6350" cap="flat" cmpd="sng" algn="ctr">
+                      <a:solidFill>
+                        <a:srgbClr val="000000"/>
+                      </a:solidFill>
+                      <a:prstDash val="solid"/>
+                      <a:round/>
+                      <a:headEnd type="none" w="med" len="med"/>
+                      <a:tailEnd type="none" w="med" len="med"/>
+                    </a:lnL>
+                    <a:lnR w="6350" cap="flat" cmpd="sng" algn="ctr">
+                      <a:solidFill>
+                        <a:srgbClr val="000000"/>
+                      </a:solidFill>
+                      <a:prstDash val="solid"/>
+                      <a:round/>
+                      <a:headEnd type="none" w="med" len="med"/>
+                      <a:tailEnd type="none" w="med" len="med"/>
+                    </a:lnR>
+                    <a:lnT w="6350" cap="flat" cmpd="sng" algn="ctr">
+                      <a:solidFill>
+                        <a:srgbClr val="000000"/>
+                      </a:solidFill>
+                      <a:prstDash val="solid"/>
+                      <a:round/>
+                      <a:headEnd type="none" w="med" len="med"/>
+                      <a:tailEnd type="none" w="med" len="med"/>
+                    </a:lnT>
+                    <a:lnB w="6350" cap="flat" cmpd="sng" algn="ctr">
+                      <a:solidFill>
+                        <a:srgbClr val="000000"/>
+                      </a:solidFill>
+                      <a:prstDash val="solid"/>
+                      <a:round/>
+                      <a:headEnd type="none" w="med" len="med"/>
+                      <a:tailEnd type="none" w="med" len="med"/>
+                    </a:lnB>
+                    <a:solidFill>
+                      <a:srgbClr val="FFDE75"/>
+                    </a:solidFill>
+                  </a:tcPr>
+                </a:tc>
+                <a:tc>
+                  <a:txBody>
+                    <a:bodyPr/>
+                    <a:lstStyle/>
+                    <a:p>
+                      <a:pPr algn="ctr" fontAlgn="ctr"/>
+                      <a:r>
+                        <a:rPr lang="es-ES" sz="1200" b="0" i="0" u="none" strike="noStrike">
+                          <a:solidFill>
+                            <a:srgbClr val="000000"/>
+                          </a:solidFill>
+                          <a:effectLst/>
+                          <a:latin typeface="Calibri" panose="020F0502020204030204" pitchFamily="34" charset="0"/>
+                        </a:rPr>
+                        <a:t>14</a:t>
+                      </a:r>
+                    </a:p>
+                  </a:txBody>
+                  <a:tcPr marL="9525" marR="9525" marT="9525" marB="0" anchor="ctr">
+                    <a:lnL w="6350" cap="flat" cmpd="sng" algn="ctr">
+                      <a:solidFill>
+                        <a:srgbClr val="000000"/>
+                      </a:solidFill>
+                      <a:prstDash val="solid"/>
+                      <a:round/>
+                      <a:headEnd type="none" w="med" len="med"/>
+                      <a:tailEnd type="none" w="med" len="med"/>
+                    </a:lnL>
+                    <a:lnR w="6350" cap="flat" cmpd="sng" algn="ctr">
+                      <a:solidFill>
+                        <a:srgbClr val="000000"/>
+                      </a:solidFill>
+                      <a:prstDash val="solid"/>
+                      <a:round/>
+                      <a:headEnd type="none" w="med" len="med"/>
+                      <a:tailEnd type="none" w="med" len="med"/>
+                    </a:lnR>
+                    <a:lnT w="6350" cap="flat" cmpd="sng" algn="ctr">
+                      <a:solidFill>
+                        <a:srgbClr val="000000"/>
+                      </a:solidFill>
+                      <a:prstDash val="solid"/>
+                      <a:round/>
+                      <a:headEnd type="none" w="med" len="med"/>
+                      <a:tailEnd type="none" w="med" len="med"/>
+                    </a:lnT>
+                    <a:lnB w="6350" cap="flat" cmpd="sng" algn="ctr">
+                      <a:solidFill>
+                        <a:srgbClr val="000000"/>
+                      </a:solidFill>
+                      <a:prstDash val="solid"/>
+                      <a:round/>
+                      <a:headEnd type="none" w="med" len="med"/>
+                      <a:tailEnd type="none" w="med" len="med"/>
+                    </a:lnB>
+                    <a:solidFill>
+                      <a:srgbClr val="FFDE75"/>
+                    </a:solidFill>
+                  </a:tcPr>
+                </a:tc>
+                <a:tc>
+                  <a:txBody>
+                    <a:bodyPr/>
+                    <a:lstStyle/>
+                    <a:p>
+                      <a:pPr algn="ctr" fontAlgn="ctr"/>
+                      <a:endParaRPr lang="es-ES" sz="1200" b="0" i="0" u="none" strike="noStrike">
+                        <a:solidFill>
+                          <a:srgbClr val="000000"/>
+                        </a:solidFill>
+                        <a:effectLst/>
+                        <a:latin typeface="Calibri" panose="020F0502020204030204" pitchFamily="34" charset="0"/>
+                      </a:endParaRPr>
+                    </a:p>
+                  </a:txBody>
+                  <a:tcPr marL="9525" marR="9525" marT="9525" marB="0" anchor="ctr">
+                    <a:lnL w="6350" cap="flat" cmpd="sng" algn="ctr">
+                      <a:solidFill>
+                        <a:srgbClr val="000000"/>
+                      </a:solidFill>
+                      <a:prstDash val="solid"/>
+                      <a:round/>
+                      <a:headEnd type="none" w="med" len="med"/>
+                      <a:tailEnd type="none" w="med" len="med"/>
+                    </a:lnL>
+                    <a:lnR>
+                      <a:noFill/>
+                    </a:lnR>
+                    <a:lnT w="6350" cap="flat" cmpd="sng" algn="ctr">
+                      <a:solidFill>
+                        <a:srgbClr val="000000"/>
+                      </a:solidFill>
+                      <a:prstDash val="solid"/>
+                      <a:round/>
+                      <a:headEnd type="none" w="med" len="med"/>
+                      <a:tailEnd type="none" w="med" len="med"/>
+                    </a:lnT>
+                    <a:lnB>
+                      <a:noFill/>
+                    </a:lnB>
+                  </a:tcPr>
+                </a:tc>
+                <a:tc>
+                  <a:txBody>
+                    <a:bodyPr/>
+                    <a:lstStyle/>
+                    <a:p>
+                      <a:pPr algn="ctr" fontAlgn="ctr"/>
+                      <a:endParaRPr lang="es-ES" sz="1200" b="0" i="0" u="none" strike="noStrike">
+                        <a:solidFill>
+                          <a:srgbClr val="000000"/>
+                        </a:solidFill>
+                        <a:effectLst/>
+                        <a:latin typeface="Calibri" panose="020F0502020204030204" pitchFamily="34" charset="0"/>
+                      </a:endParaRPr>
+                    </a:p>
+                  </a:txBody>
+                  <a:tcPr marL="9525" marR="9525" marT="9525" marB="0" anchor="ctr">
+                    <a:lnL>
+                      <a:noFill/>
+                    </a:lnL>
+                    <a:lnR>
+                      <a:noFill/>
+                    </a:lnR>
+                    <a:lnT w="6350" cap="flat" cmpd="sng" algn="ctr">
+                      <a:solidFill>
+                        <a:srgbClr val="000000"/>
+                      </a:solidFill>
+                      <a:prstDash val="solid"/>
+                      <a:round/>
+                      <a:headEnd type="none" w="med" len="med"/>
+                      <a:tailEnd type="none" w="med" len="med"/>
+                    </a:lnT>
+                    <a:lnB w="6350" cap="flat" cmpd="sng" algn="ctr">
+                      <a:solidFill>
+                        <a:srgbClr val="000000"/>
+                      </a:solidFill>
+                      <a:prstDash val="solid"/>
+                      <a:round/>
+                      <a:headEnd type="none" w="med" len="med"/>
+                      <a:tailEnd type="none" w="med" len="med"/>
+                    </a:lnB>
+                  </a:tcPr>
+                </a:tc>
+                <a:tc>
+                  <a:txBody>
+                    <a:bodyPr/>
+                    <a:lstStyle/>
+                    <a:p>
+                      <a:pPr algn="l" fontAlgn="b"/>
+                      <a:endParaRPr lang="es-ES" sz="1200" b="0" i="0" u="none" strike="noStrike">
+                        <a:solidFill>
+                          <a:srgbClr val="000000"/>
+                        </a:solidFill>
+                        <a:effectLst/>
+                        <a:latin typeface="Calibri" panose="020F0502020204030204" pitchFamily="34" charset="0"/>
+                      </a:endParaRPr>
+                    </a:p>
+                  </a:txBody>
+                  <a:tcPr marL="9525" marR="9525" marT="9525" marB="0" anchor="b">
+                    <a:lnL>
+                      <a:noFill/>
+                    </a:lnL>
+                    <a:lnR>
+                      <a:noFill/>
+                    </a:lnR>
+                    <a:lnT>
+                      <a:noFill/>
+                    </a:lnT>
+                    <a:lnB>
+                      <a:noFill/>
+                    </a:lnB>
+                  </a:tcPr>
+                </a:tc>
+                <a:extLst>
+                  <a:ext uri="{0D108BD9-81ED-4DB2-BD59-A6C34878D82A}">
+                    <a16:rowId xmlns:a16="http://schemas.microsoft.com/office/drawing/2014/main" val="10006"/>
+                  </a:ext>
+                </a:extLst>
+              </a:tr>
+              <a:tr h="190500">
+                <a:tc>
+                  <a:txBody>
+                    <a:bodyPr/>
+                    <a:lstStyle/>
+                    <a:p>
+                      <a:pPr algn="ctr" fontAlgn="ctr"/>
+                      <a:r>
+                        <a:rPr lang="es-ES" sz="1200" b="1" i="0" u="none" strike="noStrike">
+                          <a:solidFill>
+                            <a:srgbClr val="000000"/>
+                          </a:solidFill>
+                          <a:effectLst/>
+                          <a:latin typeface="Calibri" panose="020F0502020204030204" pitchFamily="34" charset="0"/>
+                        </a:rPr>
+                        <a:t>Suma de pi2</a:t>
+                      </a:r>
+                    </a:p>
+                  </a:txBody>
+                  <a:tcPr marL="9525" marR="9525" marT="9525" marB="0" anchor="ctr">
+                    <a:lnL w="6350" cap="flat" cmpd="sng" algn="ctr">
+                      <a:solidFill>
+                        <a:srgbClr val="000000"/>
+                      </a:solidFill>
+                      <a:prstDash val="solid"/>
+                      <a:round/>
+                      <a:headEnd type="none" w="med" len="med"/>
+                      <a:tailEnd type="none" w="med" len="med"/>
+                    </a:lnL>
+                    <a:lnR w="6350" cap="flat" cmpd="sng" algn="ctr">
+                      <a:solidFill>
+                        <a:srgbClr val="000000"/>
+                      </a:solidFill>
+                      <a:prstDash val="solid"/>
+                      <a:round/>
+                      <a:headEnd type="none" w="med" len="med"/>
+                      <a:tailEnd type="none" w="med" len="med"/>
+                    </a:lnR>
+                    <a:lnT w="6350" cap="flat" cmpd="sng" algn="ctr">
+                      <a:solidFill>
+                        <a:srgbClr val="000000"/>
+                      </a:solidFill>
+                      <a:prstDash val="solid"/>
+                      <a:round/>
+                      <a:headEnd type="none" w="med" len="med"/>
+                      <a:tailEnd type="none" w="med" len="med"/>
+                    </a:lnT>
+                    <a:lnB w="6350" cap="flat" cmpd="sng" algn="ctr">
+                      <a:solidFill>
+                        <a:srgbClr val="000000"/>
+                      </a:solidFill>
+                      <a:prstDash val="solid"/>
+                      <a:round/>
+                      <a:headEnd type="none" w="med" len="med"/>
+                      <a:tailEnd type="none" w="med" len="med"/>
+                    </a:lnB>
+                    <a:solidFill>
+                      <a:srgbClr val="FFB7DB"/>
+                    </a:solidFill>
+                  </a:tcPr>
+                </a:tc>
+                <a:tc>
+                  <a:txBody>
+                    <a:bodyPr/>
+                    <a:lstStyle/>
+                    <a:p>
+                      <a:pPr algn="ctr" fontAlgn="ctr"/>
+                      <a:endParaRPr lang="es-ES" sz="1200" b="0" i="0" u="none" strike="noStrike">
+                        <a:solidFill>
+                          <a:srgbClr val="000000"/>
+                        </a:solidFill>
+                        <a:effectLst/>
+                        <a:latin typeface="Calibri" panose="020F0502020204030204" pitchFamily="34" charset="0"/>
+                      </a:endParaRPr>
+                    </a:p>
+                  </a:txBody>
+                  <a:tcPr marL="9525" marR="9525" marT="9525" marB="0" anchor="ctr">
+                    <a:lnL w="6350" cap="flat" cmpd="sng" algn="ctr">
+                      <a:solidFill>
+                        <a:srgbClr val="000000"/>
+                      </a:solidFill>
+                      <a:prstDash val="solid"/>
+                      <a:round/>
+                      <a:headEnd type="none" w="med" len="med"/>
+                      <a:tailEnd type="none" w="med" len="med"/>
+                    </a:lnL>
+                    <a:lnR>
+                      <a:noFill/>
+                    </a:lnR>
+                    <a:lnT w="6350" cap="flat" cmpd="sng" algn="ctr">
+                      <a:solidFill>
+                        <a:srgbClr val="000000"/>
+                      </a:solidFill>
+                      <a:prstDash val="solid"/>
+                      <a:round/>
+                      <a:headEnd type="none" w="med" len="med"/>
+                      <a:tailEnd type="none" w="med" len="med"/>
+                    </a:lnT>
+                    <a:lnB>
+                      <a:noFill/>
+                    </a:lnB>
+                  </a:tcPr>
+                </a:tc>
+                <a:tc>
+                  <a:txBody>
+                    <a:bodyPr/>
+                    <a:lstStyle/>
+                    <a:p>
+                      <a:pPr algn="ctr" fontAlgn="ctr"/>
+                      <a:endParaRPr lang="es-ES" sz="1200" b="0" i="0" u="none" strike="noStrike">
+                        <a:solidFill>
+                          <a:srgbClr val="000000"/>
+                        </a:solidFill>
+                        <a:effectLst/>
+                        <a:latin typeface="Calibri" panose="020F0502020204030204" pitchFamily="34" charset="0"/>
+                      </a:endParaRPr>
+                    </a:p>
+                  </a:txBody>
+                  <a:tcPr marL="9525" marR="9525" marT="9525" marB="0" anchor="ctr">
+                    <a:lnL>
+                      <a:noFill/>
+                    </a:lnL>
+                    <a:lnR w="6350" cap="flat" cmpd="sng" algn="ctr">
+                      <a:solidFill>
+                        <a:srgbClr val="000000"/>
+                      </a:solidFill>
+                      <a:prstDash val="solid"/>
+                      <a:round/>
+                      <a:headEnd type="none" w="med" len="med"/>
+                      <a:tailEnd type="none" w="med" len="med"/>
+                    </a:lnR>
+                    <a:lnT>
+                      <a:noFill/>
+                    </a:lnT>
+                    <a:lnB>
+                      <a:noFill/>
+                    </a:lnB>
+                  </a:tcPr>
+                </a:tc>
+                <a:tc>
+                  <a:txBody>
+                    <a:bodyPr/>
+                    <a:lstStyle/>
+                    <a:p>
+                      <a:pPr algn="ctr" fontAlgn="ctr"/>
+                      <a:r>
+                        <a:rPr lang="es-ES" sz="1200" b="0" i="0" u="none" strike="noStrike">
+                          <a:solidFill>
+                            <a:srgbClr val="000000"/>
+                          </a:solidFill>
+                          <a:effectLst/>
+                          <a:latin typeface="Calibri" panose="020F0502020204030204" pitchFamily="34" charset="0"/>
+                        </a:rPr>
+                        <a:t>0,592</a:t>
+                      </a:r>
+                    </a:p>
+                  </a:txBody>
+                  <a:tcPr marL="9525" marR="9525" marT="9525" marB="0" anchor="ctr">
+                    <a:lnL w="6350" cap="flat" cmpd="sng" algn="ctr">
+                      <a:solidFill>
+                        <a:srgbClr val="000000"/>
+                      </a:solidFill>
+                      <a:prstDash val="solid"/>
+                      <a:round/>
+                      <a:headEnd type="none" w="med" len="med"/>
+                      <a:tailEnd type="none" w="med" len="med"/>
+                    </a:lnL>
+                    <a:lnR w="6350" cap="flat" cmpd="sng" algn="ctr">
+                      <a:solidFill>
+                        <a:srgbClr val="000000"/>
+                      </a:solidFill>
+                      <a:prstDash val="solid"/>
+                      <a:round/>
+                      <a:headEnd type="none" w="med" len="med"/>
+                      <a:tailEnd type="none" w="med" len="med"/>
+                    </a:lnR>
+                    <a:lnT w="6350" cap="flat" cmpd="sng" algn="ctr">
+                      <a:solidFill>
+                        <a:srgbClr val="000000"/>
+                      </a:solidFill>
+                      <a:prstDash val="solid"/>
+                      <a:round/>
+                      <a:headEnd type="none" w="med" len="med"/>
+                      <a:tailEnd type="none" w="med" len="med"/>
+                    </a:lnT>
+                    <a:lnB w="6350" cap="flat" cmpd="sng" algn="ctr">
+                      <a:solidFill>
+                        <a:srgbClr val="000000"/>
+                      </a:solidFill>
+                      <a:prstDash val="solid"/>
+                      <a:round/>
+                      <a:headEnd type="none" w="med" len="med"/>
+                      <a:tailEnd type="none" w="med" len="med"/>
+                    </a:lnB>
+                    <a:solidFill>
+                      <a:srgbClr val="FFB7DB"/>
+                    </a:solidFill>
+                  </a:tcPr>
+                </a:tc>
+                <a:tc>
+                  <a:txBody>
+                    <a:bodyPr/>
+                    <a:lstStyle/>
+                    <a:p>
+                      <a:pPr algn="l" fontAlgn="b"/>
+                      <a:endParaRPr lang="es-ES" sz="1200" b="0" i="0" u="none" strike="noStrike">
+                        <a:solidFill>
+                          <a:srgbClr val="000000"/>
+                        </a:solidFill>
+                        <a:effectLst/>
+                        <a:latin typeface="Calibri" panose="020F0502020204030204" pitchFamily="34" charset="0"/>
+                      </a:endParaRPr>
+                    </a:p>
+                  </a:txBody>
+                  <a:tcPr marL="9525" marR="9525" marT="9525" marB="0" anchor="b">
+                    <a:lnL w="6350" cap="flat" cmpd="sng" algn="ctr">
+                      <a:solidFill>
+                        <a:srgbClr val="000000"/>
+                      </a:solidFill>
+                      <a:prstDash val="solid"/>
+                      <a:round/>
+                      <a:headEnd type="none" w="med" len="med"/>
+                      <a:tailEnd type="none" w="med" len="med"/>
+                    </a:lnL>
+                    <a:lnR>
+                      <a:noFill/>
+                    </a:lnR>
+                    <a:lnT>
+                      <a:noFill/>
+                    </a:lnT>
+                    <a:lnB>
+                      <a:noFill/>
+                    </a:lnB>
+                  </a:tcPr>
+                </a:tc>
+                <a:extLst>
+                  <a:ext uri="{0D108BD9-81ED-4DB2-BD59-A6C34878D82A}">
+                    <a16:rowId xmlns:a16="http://schemas.microsoft.com/office/drawing/2014/main" val="10007"/>
+                  </a:ext>
+                </a:extLst>
+              </a:tr>
+              <a:tr h="190500">
+                <a:tc>
+                  <a:txBody>
+                    <a:bodyPr/>
+                    <a:lstStyle/>
+                    <a:p>
+                      <a:pPr algn="ctr" fontAlgn="ctr"/>
+                      <a:r>
+                        <a:rPr lang="es-ES" sz="1200" b="1" i="0" u="none" strike="noStrike">
+                          <a:solidFill>
+                            <a:srgbClr val="000000"/>
+                          </a:solidFill>
+                          <a:effectLst/>
+                          <a:latin typeface="Calibri" panose="020F0502020204030204" pitchFamily="34" charset="0"/>
+                        </a:rPr>
+                        <a:t>D = 1-∑pi2</a:t>
+                      </a:r>
+                    </a:p>
+                  </a:txBody>
+                  <a:tcPr marL="9525" marR="9525" marT="9525" marB="0" anchor="ctr">
+                    <a:lnL w="6350" cap="flat" cmpd="sng" algn="ctr">
+                      <a:solidFill>
+                        <a:srgbClr val="000000"/>
+                      </a:solidFill>
+                      <a:prstDash val="solid"/>
+                      <a:round/>
+                      <a:headEnd type="none" w="med" len="med"/>
+                      <a:tailEnd type="none" w="med" len="med"/>
+                    </a:lnL>
+                    <a:lnR w="6350" cap="flat" cmpd="sng" algn="ctr">
+                      <a:solidFill>
+                        <a:srgbClr val="000000"/>
+                      </a:solidFill>
+                      <a:prstDash val="solid"/>
+                      <a:round/>
+                      <a:headEnd type="none" w="med" len="med"/>
+                      <a:tailEnd type="none" w="med" len="med"/>
+                    </a:lnR>
+                    <a:lnT w="6350" cap="flat" cmpd="sng" algn="ctr">
+                      <a:solidFill>
+                        <a:srgbClr val="000000"/>
+                      </a:solidFill>
+                      <a:prstDash val="solid"/>
+                      <a:round/>
+                      <a:headEnd type="none" w="med" len="med"/>
+                      <a:tailEnd type="none" w="med" len="med"/>
+                    </a:lnT>
+                    <a:lnB w="6350" cap="flat" cmpd="sng" algn="ctr">
+                      <a:solidFill>
+                        <a:srgbClr val="000000"/>
+                      </a:solidFill>
+                      <a:prstDash val="solid"/>
+                      <a:round/>
+                      <a:headEnd type="none" w="med" len="med"/>
+                      <a:tailEnd type="none" w="med" len="med"/>
+                    </a:lnB>
+                    <a:solidFill>
+                      <a:srgbClr val="B7B7FF"/>
+                    </a:solidFill>
+                  </a:tcPr>
+                </a:tc>
+                <a:tc>
+                  <a:txBody>
+                    <a:bodyPr/>
+                    <a:lstStyle/>
+                    <a:p>
+                      <a:pPr algn="ctr" fontAlgn="ctr"/>
+                      <a:endParaRPr lang="es-ES" sz="1200" b="0" i="0" u="none" strike="noStrike">
+                        <a:solidFill>
+                          <a:srgbClr val="000000"/>
+                        </a:solidFill>
+                        <a:effectLst/>
+                        <a:latin typeface="Calibri" panose="020F0502020204030204" pitchFamily="34" charset="0"/>
+                      </a:endParaRPr>
+                    </a:p>
+                  </a:txBody>
+                  <a:tcPr marL="9525" marR="9525" marT="9525" marB="0" anchor="ctr">
+                    <a:lnL w="6350" cap="flat" cmpd="sng" algn="ctr">
+                      <a:solidFill>
+                        <a:srgbClr val="000000"/>
+                      </a:solidFill>
+                      <a:prstDash val="solid"/>
+                      <a:round/>
+                      <a:headEnd type="none" w="med" len="med"/>
+                      <a:tailEnd type="none" w="med" len="med"/>
+                    </a:lnL>
+                    <a:lnR>
+                      <a:noFill/>
+                    </a:lnR>
+                    <a:lnT>
+                      <a:noFill/>
+                    </a:lnT>
+                    <a:lnB>
+                      <a:noFill/>
+                    </a:lnB>
+                  </a:tcPr>
+                </a:tc>
+                <a:tc>
+                  <a:txBody>
+                    <a:bodyPr/>
+                    <a:lstStyle/>
+                    <a:p>
+                      <a:pPr algn="ctr" fontAlgn="ctr"/>
+                      <a:endParaRPr lang="es-ES" sz="1200" b="0" i="0" u="none" strike="noStrike">
+                        <a:solidFill>
+                          <a:srgbClr val="000000"/>
+                        </a:solidFill>
+                        <a:effectLst/>
+                        <a:latin typeface="Calibri" panose="020F0502020204030204" pitchFamily="34" charset="0"/>
+                      </a:endParaRPr>
+                    </a:p>
+                  </a:txBody>
+                  <a:tcPr marL="9525" marR="9525" marT="9525" marB="0" anchor="ctr">
+                    <a:lnL>
+                      <a:noFill/>
+                    </a:lnL>
+                    <a:lnR w="6350" cap="flat" cmpd="sng" algn="ctr">
+                      <a:solidFill>
+                        <a:srgbClr val="000000"/>
+                      </a:solidFill>
+                      <a:prstDash val="solid"/>
+                      <a:round/>
+                      <a:headEnd type="none" w="med" len="med"/>
+                      <a:tailEnd type="none" w="med" len="med"/>
+                    </a:lnR>
+                    <a:lnT>
+                      <a:noFill/>
+                    </a:lnT>
+                    <a:lnB>
+                      <a:noFill/>
+                    </a:lnB>
+                  </a:tcPr>
+                </a:tc>
+                <a:tc>
+                  <a:txBody>
+                    <a:bodyPr/>
+                    <a:lstStyle/>
+                    <a:p>
+                      <a:pPr algn="ctr" fontAlgn="ctr"/>
+                      <a:r>
+                        <a:rPr lang="es-ES" sz="1200" b="0" i="0" u="none" strike="noStrike">
+                          <a:solidFill>
+                            <a:srgbClr val="000000"/>
+                          </a:solidFill>
+                          <a:effectLst/>
+                          <a:latin typeface="Calibri" panose="020F0502020204030204" pitchFamily="34" charset="0"/>
+                        </a:rPr>
+                        <a:t>0,408</a:t>
+                      </a:r>
+                    </a:p>
+                  </a:txBody>
+                  <a:tcPr marL="9525" marR="9525" marT="9525" marB="0" anchor="ctr">
+                    <a:lnL w="6350" cap="flat" cmpd="sng" algn="ctr">
+                      <a:solidFill>
+                        <a:srgbClr val="000000"/>
+                      </a:solidFill>
+                      <a:prstDash val="solid"/>
+                      <a:round/>
+                      <a:headEnd type="none" w="med" len="med"/>
+                      <a:tailEnd type="none" w="med" len="med"/>
+                    </a:lnL>
+                    <a:lnR w="6350" cap="flat" cmpd="sng" algn="ctr">
+                      <a:solidFill>
+                        <a:srgbClr val="000000"/>
+                      </a:solidFill>
+                      <a:prstDash val="solid"/>
+                      <a:round/>
+                      <a:headEnd type="none" w="med" len="med"/>
+                      <a:tailEnd type="none" w="med" len="med"/>
+                    </a:lnR>
+                    <a:lnT w="6350" cap="flat" cmpd="sng" algn="ctr">
+                      <a:solidFill>
+                        <a:srgbClr val="000000"/>
+                      </a:solidFill>
+                      <a:prstDash val="solid"/>
+                      <a:round/>
+                      <a:headEnd type="none" w="med" len="med"/>
+                      <a:tailEnd type="none" w="med" len="med"/>
+                    </a:lnT>
+                    <a:lnB w="6350" cap="flat" cmpd="sng" algn="ctr">
+                      <a:solidFill>
+                        <a:srgbClr val="000000"/>
+                      </a:solidFill>
+                      <a:prstDash val="solid"/>
+                      <a:round/>
+                      <a:headEnd type="none" w="med" len="med"/>
+                      <a:tailEnd type="none" w="med" len="med"/>
+                    </a:lnB>
+                    <a:solidFill>
+                      <a:srgbClr val="B7B7FF"/>
+                    </a:solidFill>
+                  </a:tcPr>
+                </a:tc>
+                <a:tc>
+                  <a:txBody>
+                    <a:bodyPr/>
+                    <a:lstStyle/>
+                    <a:p>
+                      <a:pPr algn="l" fontAlgn="b"/>
+                      <a:endParaRPr lang="es-ES" sz="1200" b="0" i="0" u="none" strike="noStrike">
+                        <a:solidFill>
+                          <a:srgbClr val="000000"/>
+                        </a:solidFill>
+                        <a:effectLst/>
+                        <a:latin typeface="Calibri" panose="020F0502020204030204" pitchFamily="34" charset="0"/>
+                      </a:endParaRPr>
+                    </a:p>
+                  </a:txBody>
+                  <a:tcPr marL="9525" marR="9525" marT="9525" marB="0" anchor="b">
+                    <a:lnL w="6350" cap="flat" cmpd="sng" algn="ctr">
+                      <a:solidFill>
+                        <a:srgbClr val="000000"/>
+                      </a:solidFill>
+                      <a:prstDash val="solid"/>
+                      <a:round/>
+                      <a:headEnd type="none" w="med" len="med"/>
+                      <a:tailEnd type="none" w="med" len="med"/>
+                    </a:lnL>
+                    <a:lnR>
+                      <a:noFill/>
+                    </a:lnR>
+                    <a:lnT>
+                      <a:noFill/>
+                    </a:lnT>
+                    <a:lnB>
+                      <a:noFill/>
+                    </a:lnB>
+                  </a:tcPr>
+                </a:tc>
+                <a:extLst>
+                  <a:ext uri="{0D108BD9-81ED-4DB2-BD59-A6C34878D82A}">
+                    <a16:rowId xmlns:a16="http://schemas.microsoft.com/office/drawing/2014/main" val="10008"/>
+                  </a:ext>
+                </a:extLst>
+              </a:tr>
+              <a:tr h="190500">
+                <a:tc>
+                  <a:txBody>
+                    <a:bodyPr/>
+                    <a:lstStyle/>
+                    <a:p>
+                      <a:pPr algn="ctr" fontAlgn="ctr"/>
+                      <a:endParaRPr lang="es-ES" sz="1200" b="1" i="0" u="none" strike="noStrike">
+                        <a:solidFill>
+                          <a:srgbClr val="000000"/>
+                        </a:solidFill>
+                        <a:effectLst/>
+                        <a:latin typeface="Calibri" panose="020F0502020204030204" pitchFamily="34" charset="0"/>
+                      </a:endParaRPr>
+                    </a:p>
+                  </a:txBody>
+                  <a:tcPr marL="9525" marR="9525" marT="9525" marB="0" anchor="ctr">
+                    <a:lnL>
+                      <a:noFill/>
+                    </a:lnL>
+                    <a:lnR>
+                      <a:noFill/>
+                    </a:lnR>
+                    <a:lnT w="6350" cap="flat" cmpd="sng" algn="ctr">
+                      <a:solidFill>
+                        <a:srgbClr val="000000"/>
+                      </a:solidFill>
+                      <a:prstDash val="solid"/>
+                      <a:round/>
+                      <a:headEnd type="none" w="med" len="med"/>
+                      <a:tailEnd type="none" w="med" len="med"/>
+                    </a:lnT>
+                    <a:lnB w="6350" cap="flat" cmpd="sng" algn="ctr">
+                      <a:solidFill>
+                        <a:srgbClr val="4F6228"/>
+                      </a:solidFill>
+                      <a:prstDash val="solid"/>
+                      <a:round/>
+                      <a:headEnd type="none" w="med" len="med"/>
+                      <a:tailEnd type="none" w="med" len="med"/>
+                    </a:lnB>
+                  </a:tcPr>
+                </a:tc>
+                <a:tc>
+                  <a:txBody>
+                    <a:bodyPr/>
+                    <a:lstStyle/>
+                    <a:p>
+                      <a:pPr algn="ctr" fontAlgn="ctr"/>
+                      <a:endParaRPr lang="es-ES" sz="1200" b="0" i="0" u="none" strike="noStrike">
+                        <a:solidFill>
+                          <a:srgbClr val="000000"/>
+                        </a:solidFill>
+                        <a:effectLst/>
+                        <a:latin typeface="Calibri" panose="020F0502020204030204" pitchFamily="34" charset="0"/>
+                      </a:endParaRPr>
+                    </a:p>
+                  </a:txBody>
+                  <a:tcPr marL="9525" marR="9525" marT="9525" marB="0" anchor="ctr">
+                    <a:lnL>
+                      <a:noFill/>
+                    </a:lnL>
+                    <a:lnR>
+                      <a:noFill/>
+                    </a:lnR>
+                    <a:lnT>
+                      <a:noFill/>
+                    </a:lnT>
+                    <a:lnB w="6350" cap="flat" cmpd="sng" algn="ctr">
+                      <a:solidFill>
+                        <a:srgbClr val="4F6228"/>
+                      </a:solidFill>
+                      <a:prstDash val="solid"/>
+                      <a:round/>
+                      <a:headEnd type="none" w="med" len="med"/>
+                      <a:tailEnd type="none" w="med" len="med"/>
+                    </a:lnB>
+                  </a:tcPr>
+                </a:tc>
+                <a:tc>
+                  <a:txBody>
+                    <a:bodyPr/>
+                    <a:lstStyle/>
+                    <a:p>
+                      <a:pPr algn="ctr" fontAlgn="ctr"/>
+                      <a:endParaRPr lang="es-ES" sz="1200" b="0" i="0" u="none" strike="noStrike">
+                        <a:solidFill>
+                          <a:srgbClr val="000000"/>
+                        </a:solidFill>
+                        <a:effectLst/>
+                        <a:latin typeface="Calibri" panose="020F0502020204030204" pitchFamily="34" charset="0"/>
+                      </a:endParaRPr>
+                    </a:p>
+                  </a:txBody>
+                  <a:tcPr marL="9525" marR="9525" marT="9525" marB="0" anchor="ctr">
+                    <a:lnL>
+                      <a:noFill/>
+                    </a:lnL>
+                    <a:lnR>
+                      <a:noFill/>
+                    </a:lnR>
+                    <a:lnT>
+                      <a:noFill/>
+                    </a:lnT>
+                    <a:lnB w="6350" cap="flat" cmpd="sng" algn="ctr">
+                      <a:solidFill>
+                        <a:srgbClr val="4F6228"/>
+                      </a:solidFill>
+                      <a:prstDash val="solid"/>
+                      <a:round/>
+                      <a:headEnd type="none" w="med" len="med"/>
+                      <a:tailEnd type="none" w="med" len="med"/>
+                    </a:lnB>
+                  </a:tcPr>
+                </a:tc>
+                <a:tc>
+                  <a:txBody>
+                    <a:bodyPr/>
+                    <a:lstStyle/>
+                    <a:p>
+                      <a:pPr algn="ctr" fontAlgn="ctr"/>
+                      <a:r>
+                        <a:rPr lang="es-ES" sz="1200" b="0" i="0" u="none" strike="noStrike">
+                          <a:solidFill>
+                            <a:srgbClr val="000000"/>
+                          </a:solidFill>
+                          <a:effectLst/>
+                          <a:latin typeface="Calibri" panose="020F0502020204030204" pitchFamily="34" charset="0"/>
+                        </a:rPr>
+                        <a:t> </a:t>
+                      </a:r>
+                    </a:p>
+                  </a:txBody>
+                  <a:tcPr marL="9525" marR="9525" marT="9525" marB="0" anchor="ctr">
+                    <a:lnL>
+                      <a:noFill/>
+                    </a:lnL>
+                    <a:lnR>
+                      <a:noFill/>
+                    </a:lnR>
+                    <a:lnT w="6350" cap="flat" cmpd="sng" algn="ctr">
+                      <a:solidFill>
+                        <a:srgbClr val="000000"/>
+                      </a:solidFill>
+                      <a:prstDash val="solid"/>
+                      <a:round/>
+                      <a:headEnd type="none" w="med" len="med"/>
+                      <a:tailEnd type="none" w="med" len="med"/>
+                    </a:lnT>
+                    <a:lnB w="6350" cap="flat" cmpd="sng" algn="ctr">
+                      <a:solidFill>
+                        <a:srgbClr val="4F6228"/>
+                      </a:solidFill>
+                      <a:prstDash val="solid"/>
+                      <a:round/>
+                      <a:headEnd type="none" w="med" len="med"/>
+                      <a:tailEnd type="none" w="med" len="med"/>
+                    </a:lnB>
+                  </a:tcPr>
+                </a:tc>
+                <a:tc>
+                  <a:txBody>
+                    <a:bodyPr/>
+                    <a:lstStyle/>
+                    <a:p>
+                      <a:pPr algn="l" fontAlgn="b"/>
+                      <a:endParaRPr lang="es-ES" sz="1200" b="0" i="0" u="none" strike="noStrike">
+                        <a:solidFill>
+                          <a:srgbClr val="000000"/>
+                        </a:solidFill>
+                        <a:effectLst/>
+                        <a:latin typeface="Calibri" panose="020F0502020204030204" pitchFamily="34" charset="0"/>
+                      </a:endParaRPr>
+                    </a:p>
+                  </a:txBody>
+                  <a:tcPr marL="9525" marR="9525" marT="9525" marB="0" anchor="b">
+                    <a:lnL>
+                      <a:noFill/>
+                    </a:lnL>
+                    <a:lnR>
+                      <a:noFill/>
+                    </a:lnR>
+                    <a:lnT>
+                      <a:noFill/>
+                    </a:lnT>
+                    <a:lnB w="6350" cap="flat" cmpd="sng" algn="ctr">
+                      <a:solidFill>
+                        <a:srgbClr val="4F6228"/>
+                      </a:solidFill>
+                      <a:prstDash val="solid"/>
+                      <a:round/>
+                      <a:headEnd type="none" w="med" len="med"/>
+                      <a:tailEnd type="none" w="med" len="med"/>
+                    </a:lnB>
+                  </a:tcPr>
+                </a:tc>
+                <a:extLst>
+                  <a:ext uri="{0D108BD9-81ED-4DB2-BD59-A6C34878D82A}">
+                    <a16:rowId xmlns:a16="http://schemas.microsoft.com/office/drawing/2014/main" val="10009"/>
+                  </a:ext>
+                </a:extLst>
+              </a:tr>
+              <a:tr h="190500">
+                <a:tc gridSpan="5">
+                  <a:txBody>
+                    <a:bodyPr/>
+                    <a:lstStyle/>
+                    <a:p>
+                      <a:pPr algn="l" fontAlgn="ctr"/>
+                      <a:r>
+                        <a:rPr lang="es-ES" sz="1050" b="1" i="0" u="none" strike="noStrike">
+                          <a:solidFill>
+                            <a:srgbClr val="4F6228"/>
+                          </a:solidFill>
+                          <a:effectLst/>
+                          <a:latin typeface="Arial Narrow" panose="020B0606020202030204" pitchFamily="34" charset="0"/>
+                        </a:rPr>
+                        <a:t>Número de individuos por categoría del Factor (Formaciones Vegetales o Ecosistemas) = ni  </a:t>
+                      </a:r>
+                    </a:p>
+                  </a:txBody>
+                  <a:tcPr marL="9525" marR="9525" marT="9525" marB="0" anchor="ctr">
+                    <a:lnL w="6350" cap="flat" cmpd="sng" algn="ctr">
+                      <a:solidFill>
+                        <a:srgbClr val="000000"/>
+                      </a:solidFill>
+                      <a:prstDash val="solid"/>
+                      <a:round/>
+                      <a:headEnd type="none" w="med" len="med"/>
+                      <a:tailEnd type="none" w="med" len="med"/>
+                    </a:lnL>
+                    <a:lnR w="6350" cap="flat" cmpd="sng" algn="ctr">
+                      <a:solidFill>
+                        <a:srgbClr val="4F6228"/>
+                      </a:solidFill>
+                      <a:prstDash val="solid"/>
+                      <a:round/>
+                      <a:headEnd type="none" w="med" len="med"/>
+                      <a:tailEnd type="none" w="med" len="med"/>
+                    </a:lnR>
+                    <a:lnT w="6350" cap="flat" cmpd="sng" algn="ctr">
+                      <a:solidFill>
+                        <a:srgbClr val="4F6228"/>
+                      </a:solidFill>
+                      <a:prstDash val="solid"/>
+                      <a:round/>
+                      <a:headEnd type="none" w="med" len="med"/>
+                      <a:tailEnd type="none" w="med" len="med"/>
+                    </a:lnT>
+                    <a:lnB w="6350" cap="flat" cmpd="sng" algn="ctr">
+                      <a:solidFill>
+                        <a:srgbClr val="4F6228"/>
+                      </a:solidFill>
+                      <a:prstDash val="solid"/>
+                      <a:round/>
+                      <a:headEnd type="none" w="med" len="med"/>
+                      <a:tailEnd type="none" w="med" len="med"/>
+                    </a:lnB>
+                  </a:tcPr>
+                </a:tc>
+                <a:tc hMerge="1">
+                  <a:txBody>
+                    <a:bodyPr/>
+                    <a:lstStyle/>
+                    <a:p>
+                      <a:endParaRPr lang="es-ES"/>
+                    </a:p>
+                  </a:txBody>
+                  <a:tcPr/>
+                </a:tc>
+                <a:tc hMerge="1">
+                  <a:txBody>
+                    <a:bodyPr/>
+                    <a:lstStyle/>
+                    <a:p>
+                      <a:endParaRPr lang="es-ES"/>
+                    </a:p>
+                  </a:txBody>
+                  <a:tcPr/>
+                </a:tc>
+                <a:tc hMerge="1">
+                  <a:txBody>
+                    <a:bodyPr/>
+                    <a:lstStyle/>
+                    <a:p>
+                      <a:endParaRPr lang="es-ES"/>
+                    </a:p>
+                  </a:txBody>
+                  <a:tcPr/>
+                </a:tc>
+                <a:tc hMerge="1">
+                  <a:txBody>
+                    <a:bodyPr/>
+                    <a:lstStyle/>
+                    <a:p>
+                      <a:endParaRPr lang="es-ES"/>
+                    </a:p>
+                  </a:txBody>
+                  <a:tcPr/>
+                </a:tc>
+                <a:extLst>
+                  <a:ext uri="{0D108BD9-81ED-4DB2-BD59-A6C34878D82A}">
+                    <a16:rowId xmlns:a16="http://schemas.microsoft.com/office/drawing/2014/main" val="10010"/>
+                  </a:ext>
+                </a:extLst>
+              </a:tr>
+              <a:tr h="190500">
+                <a:tc gridSpan="5">
+                  <a:txBody>
+                    <a:bodyPr/>
+                    <a:lstStyle/>
+                    <a:p>
+                      <a:pPr algn="l" fontAlgn="ctr"/>
+                      <a:r>
+                        <a:rPr lang="es-ES" sz="1050" b="1" i="0" u="none" strike="noStrike" dirty="0">
+                          <a:solidFill>
+                            <a:srgbClr val="4F6228"/>
+                          </a:solidFill>
+                          <a:effectLst/>
+                          <a:latin typeface="Arial Narrow" panose="020B0606020202030204" pitchFamily="34" charset="0"/>
+                        </a:rPr>
+                        <a:t>Número de individuos totales = N</a:t>
+                      </a:r>
+                    </a:p>
+                  </a:txBody>
+                  <a:tcPr marL="9525" marR="9525" marT="9525" marB="0" anchor="ctr">
+                    <a:lnL w="6350" cap="flat" cmpd="sng" algn="ctr">
+                      <a:solidFill>
+                        <a:srgbClr val="4F6228"/>
+                      </a:solidFill>
+                      <a:prstDash val="solid"/>
+                      <a:round/>
+                      <a:headEnd type="none" w="med" len="med"/>
+                      <a:tailEnd type="none" w="med" len="med"/>
+                    </a:lnL>
+                    <a:lnR w="6350" cap="flat" cmpd="sng" algn="ctr">
+                      <a:solidFill>
+                        <a:srgbClr val="4F6228"/>
+                      </a:solidFill>
+                      <a:prstDash val="solid"/>
+                      <a:round/>
+                      <a:headEnd type="none" w="med" len="med"/>
+                      <a:tailEnd type="none" w="med" len="med"/>
+                    </a:lnR>
+                    <a:lnT w="6350" cap="flat" cmpd="sng" algn="ctr">
+                      <a:solidFill>
+                        <a:srgbClr val="4F6228"/>
+                      </a:solidFill>
+                      <a:prstDash val="solid"/>
+                      <a:round/>
+                      <a:headEnd type="none" w="med" len="med"/>
+                      <a:tailEnd type="none" w="med" len="med"/>
+                    </a:lnT>
+                    <a:lnB w="6350" cap="flat" cmpd="sng" algn="ctr">
+                      <a:solidFill>
+                        <a:srgbClr val="4F6228"/>
+                      </a:solidFill>
+                      <a:prstDash val="solid"/>
+                      <a:round/>
+                      <a:headEnd type="none" w="med" len="med"/>
+                      <a:tailEnd type="none" w="med" len="med"/>
+                    </a:lnB>
+                  </a:tcPr>
+                </a:tc>
+                <a:tc hMerge="1">
+                  <a:txBody>
+                    <a:bodyPr/>
+                    <a:lstStyle/>
+                    <a:p>
+                      <a:endParaRPr lang="es-ES"/>
+                    </a:p>
+                  </a:txBody>
+                  <a:tcPr/>
+                </a:tc>
+                <a:tc hMerge="1">
+                  <a:txBody>
+                    <a:bodyPr/>
+                    <a:lstStyle/>
+                    <a:p>
+                      <a:endParaRPr lang="es-ES"/>
+                    </a:p>
+                  </a:txBody>
+                  <a:tcPr/>
+                </a:tc>
+                <a:tc hMerge="1">
+                  <a:txBody>
+                    <a:bodyPr/>
+                    <a:lstStyle/>
+                    <a:p>
+                      <a:endParaRPr lang="es-ES"/>
+                    </a:p>
+                  </a:txBody>
+                  <a:tcPr/>
+                </a:tc>
+                <a:tc hMerge="1">
+                  <a:txBody>
+                    <a:bodyPr/>
+                    <a:lstStyle/>
+                    <a:p>
+                      <a:endParaRPr lang="es-ES"/>
+                    </a:p>
+                  </a:txBody>
+                  <a:tcPr/>
+                </a:tc>
+                <a:extLst>
+                  <a:ext uri="{0D108BD9-81ED-4DB2-BD59-A6C34878D82A}">
+                    <a16:rowId xmlns:a16="http://schemas.microsoft.com/office/drawing/2014/main" val="10011"/>
+                  </a:ext>
+                </a:extLst>
+              </a:tr>
+            </a:tbl>
+          </a:graphicData>
+        </a:graphic>
+      </p:graphicFrame>
+      <p:graphicFrame>
+        <p:nvGraphicFramePr>
+          <p:cNvPr id="3" name="Gráfico 2"/>
+          <p:cNvGraphicFramePr>
+            <a:graphicFrameLocks/>
+          </p:cNvGraphicFramePr>
+          <p:nvPr/>
+        </p:nvGraphicFramePr>
+        <p:xfrm>
+          <a:off x="2209800" y="3486149"/>
+          <a:ext cx="4572000" cy="3124200"/>
+        </p:xfrm>
+        <a:graphic>
+          <a:graphicData uri="http://schemas.openxmlformats.org/drawingml/2006/chart">
+            <c:chart xmlns:c="http://schemas.openxmlformats.org/drawingml/2006/chart" xmlns:r="http://schemas.openxmlformats.org/officeDocument/2006/relationships" r:id="rId3"/>
+          </a:graphicData>
+        </a:graphic>
+      </p:graphicFrame>
+      <p:sp>
+        <p:nvSpPr>
+          <p:cNvPr id="5" name="object 14"/>
+          <p:cNvSpPr txBox="1">
+            <a:spLocks/>
+          </p:cNvSpPr>
+          <p:nvPr/>
+        </p:nvSpPr>
+        <p:spPr>
+          <a:xfrm>
+            <a:off x="4802605" y="313119"/>
+            <a:ext cx="2664995" cy="423193"/>
+          </a:xfrm>
+          <a:prstGeom prst="rect">
+            <a:avLst/>
+          </a:prstGeom>
+        </p:spPr>
+        <p:txBody>
+          <a:bodyPr vert="horz" wrap="square" lIns="0" tIns="12700" rIns="0" bIns="0" rtlCol="0">
+            <a:spAutoFit/>
+          </a:bodyPr>
+          <a:lstStyle>
+            <a:lvl1pPr>
+              <a:defRPr>
+                <a:latin typeface="+mj-lt"/>
+                <a:ea typeface="+mj-ea"/>
+                <a:cs typeface="+mj-cs"/>
+              </a:defRPr>
+            </a:lvl1pPr>
+          </a:lstStyle>
+          <a:p>
+            <a:pPr algn="ctr">
+              <a:lnSpc>
+                <a:spcPts val="3150"/>
+              </a:lnSpc>
+              <a:spcBef>
+                <a:spcPts val="100"/>
+              </a:spcBef>
+            </a:pPr>
+            <a:r>
+              <a:rPr lang="es-ES" sz="2800" b="1" i="1" kern="0" dirty="0">
+                <a:ln w="12700">
+                  <a:solidFill>
+                    <a:srgbClr val="4F81BD"/>
+                  </a:solidFill>
+                  <a:prstDash val="solid"/>
+                </a:ln>
+                <a:pattFill prst="pct50">
+                  <a:fgClr>
+                    <a:srgbClr val="4F81BD"/>
+                  </a:fgClr>
+                  <a:bgClr>
+                    <a:srgbClr val="4F81BD">
+                      <a:lumMod val="20000"/>
+                      <a:lumOff val="80000"/>
+                    </a:srgbClr>
+                  </a:bgClr>
+                </a:pattFill>
+                <a:effectLst>
+                  <a:outerShdw dist="38100" dir="2640000" algn="bl" rotWithShape="0">
+                    <a:srgbClr val="4F81BD"/>
+                  </a:outerShdw>
+                </a:effectLst>
+                <a:latin typeface="Calibri"/>
+              </a:rPr>
+              <a:t>Anas bahamensis</a:t>
+            </a:r>
+          </a:p>
+        </p:txBody>
+      </p:sp>
+      <p:sp>
+        <p:nvSpPr>
+          <p:cNvPr id="6" name="Rectángulo redondeado 5"/>
+          <p:cNvSpPr/>
+          <p:nvPr/>
+        </p:nvSpPr>
+        <p:spPr>
+          <a:xfrm>
+            <a:off x="7010400" y="3733800"/>
+            <a:ext cx="2819400" cy="2286000"/>
+          </a:xfrm>
+          <a:prstGeom prst="roundRect">
+            <a:avLst/>
+          </a:prstGeom>
+        </p:spPr>
+        <p:style>
+          <a:lnRef idx="1">
+            <a:schemeClr val="accent2"/>
+          </a:lnRef>
+          <a:fillRef idx="3">
+            <a:schemeClr val="accent2"/>
+          </a:fillRef>
+          <a:effectRef idx="2">
+            <a:schemeClr val="accent2"/>
+          </a:effectRef>
+          <a:fontRef idx="minor">
+            <a:schemeClr val="lt1"/>
+          </a:fontRef>
+        </p:style>
+        <p:txBody>
+          <a:bodyPr rtlCol="0" anchor="ctr"/>
+          <a:lstStyle/>
+          <a:p>
+            <a:pPr algn="ctr"/>
+            <a:r>
+              <a:rPr lang="es-ES" sz="1400" dirty="0">
+                <a:solidFill>
+                  <a:prstClr val="white"/>
+                </a:solidFill>
+                <a:latin typeface="Calibri"/>
+              </a:rPr>
+              <a:t>De acuerdo a la evaluación y ecuación realizada podemos concluir que la especie </a:t>
+            </a:r>
+            <a:r>
+              <a:rPr lang="es-ES" sz="1400" i="1" dirty="0">
+                <a:solidFill>
+                  <a:prstClr val="white"/>
+                </a:solidFill>
+                <a:latin typeface="Calibri"/>
+              </a:rPr>
+              <a:t>Anas bahamensis</a:t>
+            </a:r>
+            <a:r>
+              <a:rPr lang="es-ES" sz="1400" dirty="0">
+                <a:solidFill>
+                  <a:prstClr val="white"/>
+                </a:solidFill>
+                <a:latin typeface="Calibri"/>
+              </a:rPr>
+              <a:t>, “el Pato gargantilla”, es una especie esteno o especialista, ya que el valor del Índice de Simpson es igual a 0.41 es decir que tiende a 0 y por lo tanto es una especie de nicho estrecho.</a:t>
+            </a:r>
+            <a:endParaRPr lang="es-ES" sz="1400" i="1" dirty="0">
+              <a:solidFill>
+                <a:prstClr val="white"/>
+              </a:solidFill>
+              <a:latin typeface="Calibri"/>
+            </a:endParaRPr>
+          </a:p>
+        </p:txBody>
+      </p:sp>
+      <p:pic>
+        <p:nvPicPr>
+          <p:cNvPr id="5122" name="Picture 2" descr="Ánade gargantillo - eBird"/>
+          <p:cNvPicPr>
+            <a:picLocks noChangeAspect="1" noChangeArrowheads="1"/>
+          </p:cNvPicPr>
+          <p:nvPr/>
+        </p:nvPicPr>
+        <p:blipFill>
+          <a:blip r:embed="rId4" cstate="print">
+            <a:extLst>
+              <a:ext uri="{28A0092B-C50C-407E-A947-70E740481C1C}">
+                <a14:useLocalDpi xmlns:a14="http://schemas.microsoft.com/office/drawing/2010/main" val="0"/>
+              </a:ext>
+            </a:extLst>
+          </a:blip>
+          <a:srcRect/>
+          <a:stretch>
+            <a:fillRect/>
+          </a:stretch>
+        </p:blipFill>
+        <p:spPr bwMode="auto">
+          <a:xfrm>
+            <a:off x="7241506" y="1099637"/>
+            <a:ext cx="2357188" cy="1767891"/>
+          </a:xfrm>
+          <a:prstGeom prst="rect">
+            <a:avLst/>
+          </a:prstGeom>
+          <a:ln>
+            <a:noFill/>
+          </a:ln>
+          <a:effectLst>
+            <a:outerShdw blurRad="292100" dist="139700" dir="2700000" algn="tl" rotWithShape="0">
+              <a:srgbClr val="333333">
+                <a:alpha val="65000"/>
+              </a:srgbClr>
+            </a:outerShdw>
+          </a:effectLst>
+          <a:extLst>
+            <a:ext uri="{909E8E84-426E-40DD-AFC4-6F175D3DCCD1}">
+              <a14:hiddenFill xmlns:a14="http://schemas.microsoft.com/office/drawing/2010/main">
+                <a:solidFill>
+                  <a:srgbClr val="FFFFFF"/>
+                </a:solidFill>
+              </a14:hiddenFill>
+            </a:ext>
+          </a:extLst>
+        </p:spPr>
+      </p:pic>
+    </p:spTree>
+    <p:extLst>
+      <p:ext uri="{BB962C8B-B14F-4D97-AF65-F5344CB8AC3E}">
+        <p14:creationId xmlns:p14="http://schemas.microsoft.com/office/powerpoint/2010/main" val="3099352837"/>
+      </p:ext>
+    </p:extLst>
+  </p:cSld>
+  <p:clrMapOvr>
+    <a:masterClrMapping/>
+  </p:clrMapOvr>
+</p:sld>
+</file>
+
 <file path=ppt/theme/theme1.xml><?xml version="1.0" encoding="utf-8"?>
 <a:theme xmlns:a="http://schemas.openxmlformats.org/drawingml/2006/main" name="Office Theme">
   <a:themeElements>

</xml_diff>